<commit_message>
update readme; remove deepcopy on query
</commit_message>
<xml_diff>
--- a/doc/diagrams.pptx
+++ b/doc/diagrams.pptx
@@ -5,11 +5,12 @@
     <p:sldMasterId id="2147483648" r:id="rId1"/>
   </p:sldMasterIdLst>
   <p:notesMasterIdLst>
-    <p:notesMasterId r:id="rId4"/>
+    <p:notesMasterId r:id="rId5"/>
   </p:notesMasterIdLst>
   <p:sldIdLst>
-    <p:sldId id="256" r:id="rId2"/>
-    <p:sldId id="258" r:id="rId3"/>
+    <p:sldId id="259" r:id="rId2"/>
+    <p:sldId id="256" r:id="rId3"/>
+    <p:sldId id="258" r:id="rId4"/>
   </p:sldIdLst>
   <p:sldSz cx="9144000" cy="6858000" type="screen4x3"/>
   <p:notesSz cx="6858000" cy="9144000"/>
@@ -193,7 +194,7 @@
           <a:p>
             <a:fld id="{0CB4345E-43EC-4A02-8F28-15517C09EF53}" type="datetimeFigureOut">
               <a:rPr lang="en-US" smtClean="0"/>
-              <a:t>6/3/2015</a:t>
+              <a:t>6/10/2015</a:t>
             </a:fld>
             <a:endParaRPr lang="en-US"/>
           </a:p>
@@ -629,6 +630,90 @@
 </p:notes>
 </file>
 
+<file path=ppt/notesSlides/notesSlide3.xml><?xml version="1.0" encoding="utf-8"?>
+<p:notes xmlns:a="http://schemas.openxmlformats.org/drawingml/2006/main" xmlns:r="http://schemas.openxmlformats.org/officeDocument/2006/relationships" xmlns:p="http://schemas.openxmlformats.org/presentationml/2006/main">
+  <p:cSld>
+    <p:spTree>
+      <p:nvGrpSpPr>
+        <p:cNvPr id="1" name=""/>
+        <p:cNvGrpSpPr/>
+        <p:nvPr/>
+      </p:nvGrpSpPr>
+      <p:grpSpPr>
+        <a:xfrm>
+          <a:off x="0" y="0"/>
+          <a:ext cx="0" cy="0"/>
+          <a:chOff x="0" y="0"/>
+          <a:chExt cx="0" cy="0"/>
+        </a:xfrm>
+      </p:grpSpPr>
+      <p:sp>
+        <p:nvSpPr>
+          <p:cNvPr id="2" name="Slide Image Placeholder 1"/>
+          <p:cNvSpPr>
+            <a:spLocks noGrp="1" noRot="1" noChangeAspect="1"/>
+          </p:cNvSpPr>
+          <p:nvPr>
+            <p:ph type="sldImg"/>
+          </p:nvPr>
+        </p:nvSpPr>
+        <p:spPr/>
+      </p:sp>
+      <p:sp>
+        <p:nvSpPr>
+          <p:cNvPr id="3" name="Notes Placeholder 2"/>
+          <p:cNvSpPr>
+            <a:spLocks noGrp="1"/>
+          </p:cNvSpPr>
+          <p:nvPr>
+            <p:ph type="body" idx="1"/>
+          </p:nvPr>
+        </p:nvSpPr>
+        <p:spPr/>
+        <p:txBody>
+          <a:bodyPr/>
+          <a:lstStyle/>
+          <a:p>
+            <a:endParaRPr lang="en-US" dirty="0"/>
+          </a:p>
+        </p:txBody>
+      </p:sp>
+      <p:sp>
+        <p:nvSpPr>
+          <p:cNvPr id="4" name="Slide Number Placeholder 3"/>
+          <p:cNvSpPr>
+            <a:spLocks noGrp="1"/>
+          </p:cNvSpPr>
+          <p:nvPr>
+            <p:ph type="sldNum" sz="quarter" idx="10"/>
+          </p:nvPr>
+        </p:nvSpPr>
+        <p:spPr/>
+        <p:txBody>
+          <a:bodyPr/>
+          <a:lstStyle/>
+          <a:p>
+            <a:fld id="{EE91A0F9-DD93-4661-8E8C-406D4C272672}" type="slidenum">
+              <a:rPr lang="en-US" smtClean="0"/>
+              <a:t>3</a:t>
+            </a:fld>
+            <a:endParaRPr lang="en-US"/>
+          </a:p>
+        </p:txBody>
+      </p:sp>
+    </p:spTree>
+    <p:extLst>
+      <p:ext uri="{BB962C8B-B14F-4D97-AF65-F5344CB8AC3E}">
+        <p14:creationId xmlns:p14="http://schemas.microsoft.com/office/powerpoint/2010/main" val="1350035780"/>
+      </p:ext>
+    </p:extLst>
+  </p:cSld>
+  <p:clrMapOvr>
+    <a:masterClrMapping/>
+  </p:clrMapOvr>
+</p:notes>
+</file>
+
 <file path=ppt/slideLayouts/slideLayout1.xml><?xml version="1.0" encoding="utf-8"?>
 <p:sldLayout xmlns:a="http://schemas.openxmlformats.org/drawingml/2006/main" xmlns:r="http://schemas.openxmlformats.org/officeDocument/2006/relationships" xmlns:p="http://schemas.openxmlformats.org/presentationml/2006/main" type="title" preserve="1">
   <p:cSld name="Title Slide">
@@ -810,7 +895,7 @@
           <a:p>
             <a:fld id="{F0127CAD-F51B-4F45-A535-F5B0B9733CC6}" type="datetimeFigureOut">
               <a:rPr lang="en-US" smtClean="0"/>
-              <a:t>6/3/2015</a:t>
+              <a:t>6/10/2015</a:t>
             </a:fld>
             <a:endParaRPr lang="en-US"/>
           </a:p>
@@ -980,7 +1065,7 @@
           <a:p>
             <a:fld id="{F0127CAD-F51B-4F45-A535-F5B0B9733CC6}" type="datetimeFigureOut">
               <a:rPr lang="en-US" smtClean="0"/>
-              <a:t>6/3/2015</a:t>
+              <a:t>6/10/2015</a:t>
             </a:fld>
             <a:endParaRPr lang="en-US"/>
           </a:p>
@@ -1160,7 +1245,7 @@
           <a:p>
             <a:fld id="{F0127CAD-F51B-4F45-A535-F5B0B9733CC6}" type="datetimeFigureOut">
               <a:rPr lang="en-US" smtClean="0"/>
-              <a:t>6/3/2015</a:t>
+              <a:t>6/10/2015</a:t>
             </a:fld>
             <a:endParaRPr lang="en-US"/>
           </a:p>
@@ -1330,7 +1415,7 @@
           <a:p>
             <a:fld id="{F0127CAD-F51B-4F45-A535-F5B0B9733CC6}" type="datetimeFigureOut">
               <a:rPr lang="en-US" smtClean="0"/>
-              <a:t>6/3/2015</a:t>
+              <a:t>6/10/2015</a:t>
             </a:fld>
             <a:endParaRPr lang="en-US"/>
           </a:p>
@@ -1576,7 +1661,7 @@
           <a:p>
             <a:fld id="{F0127CAD-F51B-4F45-A535-F5B0B9733CC6}" type="datetimeFigureOut">
               <a:rPr lang="en-US" smtClean="0"/>
-              <a:t>6/3/2015</a:t>
+              <a:t>6/10/2015</a:t>
             </a:fld>
             <a:endParaRPr lang="en-US"/>
           </a:p>
@@ -1864,7 +1949,7 @@
           <a:p>
             <a:fld id="{F0127CAD-F51B-4F45-A535-F5B0B9733CC6}" type="datetimeFigureOut">
               <a:rPr lang="en-US" smtClean="0"/>
-              <a:t>6/3/2015</a:t>
+              <a:t>6/10/2015</a:t>
             </a:fld>
             <a:endParaRPr lang="en-US"/>
           </a:p>
@@ -2286,7 +2371,7 @@
           <a:p>
             <a:fld id="{F0127CAD-F51B-4F45-A535-F5B0B9733CC6}" type="datetimeFigureOut">
               <a:rPr lang="en-US" smtClean="0"/>
-              <a:t>6/3/2015</a:t>
+              <a:t>6/10/2015</a:t>
             </a:fld>
             <a:endParaRPr lang="en-US"/>
           </a:p>
@@ -2404,7 +2489,7 @@
           <a:p>
             <a:fld id="{F0127CAD-F51B-4F45-A535-F5B0B9733CC6}" type="datetimeFigureOut">
               <a:rPr lang="en-US" smtClean="0"/>
-              <a:t>6/3/2015</a:t>
+              <a:t>6/10/2015</a:t>
             </a:fld>
             <a:endParaRPr lang="en-US"/>
           </a:p>
@@ -2499,7 +2584,7 @@
           <a:p>
             <a:fld id="{F0127CAD-F51B-4F45-A535-F5B0B9733CC6}" type="datetimeFigureOut">
               <a:rPr lang="en-US" smtClean="0"/>
-              <a:t>6/3/2015</a:t>
+              <a:t>6/10/2015</a:t>
             </a:fld>
             <a:endParaRPr lang="en-US"/>
           </a:p>
@@ -2776,7 +2861,7 @@
           <a:p>
             <a:fld id="{F0127CAD-F51B-4F45-A535-F5B0B9733CC6}" type="datetimeFigureOut">
               <a:rPr lang="en-US" smtClean="0"/>
-              <a:t>6/3/2015</a:t>
+              <a:t>6/10/2015</a:t>
             </a:fld>
             <a:endParaRPr lang="en-US"/>
           </a:p>
@@ -3029,7 +3114,7 @@
           <a:p>
             <a:fld id="{F0127CAD-F51B-4F45-A535-F5B0B9733CC6}" type="datetimeFigureOut">
               <a:rPr lang="en-US" smtClean="0"/>
-              <a:t>6/3/2015</a:t>
+              <a:t>6/10/2015</a:t>
             </a:fld>
             <a:endParaRPr lang="en-US"/>
           </a:p>
@@ -3242,7 +3327,7 @@
           <a:p>
             <a:fld id="{F0127CAD-F51B-4F45-A535-F5B0B9733CC6}" type="datetimeFigureOut">
               <a:rPr lang="en-US" smtClean="0"/>
-              <a:t>6/3/2015</a:t>
+              <a:t>6/10/2015</a:t>
             </a:fld>
             <a:endParaRPr lang="en-US"/>
           </a:p>
@@ -3625,8 +3710,8 @@
         </p:nvSpPr>
         <p:spPr>
           <a:xfrm>
-            <a:off x="152400" y="1676400"/>
-            <a:ext cx="8763000" cy="4876800"/>
+            <a:off x="647698" y="2999601"/>
+            <a:ext cx="7924800" cy="3324999"/>
           </a:xfrm>
           <a:prstGeom prst="rect">
             <a:avLst/>
@@ -3657,7 +3742,7 @@
           <a:lstStyle/>
           <a:p>
             <a:pPr algn="ctr"/>
-            <a:endParaRPr lang="en-US"/>
+            <a:endParaRPr lang="en-US" sz="2000" dirty="0"/>
           </a:p>
         </p:txBody>
       </p:sp>
@@ -3669,8 +3754,8 @@
         </p:nvSpPr>
         <p:spPr>
           <a:xfrm>
-            <a:off x="1524000" y="394900"/>
-            <a:ext cx="6019800" cy="1035115"/>
+            <a:off x="1600200" y="1295400"/>
+            <a:ext cx="6019800" cy="1049015"/>
           </a:xfrm>
           <a:prstGeom prst="rect">
             <a:avLst/>
@@ -3701,37 +3786,7 @@
           <a:lstStyle/>
           <a:p>
             <a:pPr algn="ctr"/>
-            <a:endParaRPr lang="en-US"/>
-          </a:p>
-        </p:txBody>
-      </p:sp>
-      <p:sp>
-        <p:nvSpPr>
-          <p:cNvPr id="5" name="TextBox 4"/>
-          <p:cNvSpPr txBox="1"/>
-          <p:nvPr/>
-        </p:nvSpPr>
-        <p:spPr>
-          <a:xfrm>
-            <a:off x="3817239" y="1153016"/>
-            <a:ext cx="1371600" cy="276999"/>
-          </a:xfrm>
-          <a:prstGeom prst="rect">
-            <a:avLst/>
-          </a:prstGeom>
-          <a:noFill/>
-        </p:spPr>
-        <p:txBody>
-          <a:bodyPr wrap="square" rtlCol="0">
-            <a:spAutoFit/>
-          </a:bodyPr>
-          <a:lstStyle/>
-          <a:p>
-            <a:r>
-              <a:rPr lang="en-US" sz="1200" dirty="0" smtClean="0"/>
-              <a:t>Frontend Servers</a:t>
-            </a:r>
-            <a:endParaRPr lang="en-US" sz="1200" dirty="0"/>
+            <a:endParaRPr lang="en-US" sz="2000"/>
           </a:p>
         </p:txBody>
       </p:sp>
@@ -3743,7 +3798,7 @@
         </p:nvSpPr>
         <p:spPr>
           <a:xfrm>
-            <a:off x="3924300" y="609600"/>
+            <a:off x="4000500" y="1524000"/>
             <a:ext cx="1219200" cy="457200"/>
           </a:xfrm>
           <a:prstGeom prst="rect">
@@ -3773,14 +3828,14 @@
           <a:p>
             <a:pPr algn="ctr"/>
             <a:r>
-              <a:rPr lang="en-US" sz="1100" dirty="0" smtClean="0">
+              <a:rPr lang="en-US" sz="1200" dirty="0" smtClean="0">
                 <a:solidFill>
                   <a:srgbClr val="002060"/>
                 </a:solidFill>
               </a:rPr>
-              <a:t>Frontend Server</a:t>
-            </a:r>
-            <a:endParaRPr lang="en-US" sz="1400" dirty="0">
+              <a:t>Client</a:t>
+            </a:r>
+            <a:endParaRPr lang="en-US" sz="1600" dirty="0">
               <a:solidFill>
                 <a:srgbClr val="002060"/>
               </a:solidFill>
@@ -3796,7 +3851,7 @@
         </p:nvSpPr>
         <p:spPr>
           <a:xfrm>
-            <a:off x="2209800" y="609600"/>
+            <a:off x="2286000" y="1524000"/>
             <a:ext cx="1219200" cy="457200"/>
           </a:xfrm>
           <a:prstGeom prst="rect">
@@ -3826,14 +3881,14 @@
           <a:p>
             <a:pPr algn="ctr"/>
             <a:r>
-              <a:rPr lang="en-US" sz="1100" dirty="0" smtClean="0">
+              <a:rPr lang="en-US" sz="1200" dirty="0" smtClean="0">
                 <a:solidFill>
                   <a:srgbClr val="002060"/>
                 </a:solidFill>
               </a:rPr>
-              <a:t>Frontend Server</a:t>
-            </a:r>
-            <a:endParaRPr lang="en-US" sz="1400" dirty="0">
+              <a:t>Client</a:t>
+            </a:r>
+            <a:endParaRPr lang="en-US" sz="1600" dirty="0">
               <a:solidFill>
                 <a:srgbClr val="002060"/>
               </a:solidFill>
@@ -3849,7 +3904,7 @@
         </p:nvSpPr>
         <p:spPr>
           <a:xfrm>
-            <a:off x="5638800" y="609600"/>
+            <a:off x="5715000" y="1524000"/>
             <a:ext cx="1219200" cy="457200"/>
           </a:xfrm>
           <a:prstGeom prst="rect">
@@ -3879,14 +3934,14 @@
           <a:p>
             <a:pPr algn="ctr"/>
             <a:r>
-              <a:rPr lang="en-US" sz="1100" dirty="0" smtClean="0">
+              <a:rPr lang="en-US" sz="1200" dirty="0" smtClean="0">
                 <a:solidFill>
                   <a:srgbClr val="002060"/>
                 </a:solidFill>
               </a:rPr>
-              <a:t>Frontend Server</a:t>
-            </a:r>
-            <a:endParaRPr lang="en-US" sz="1400" dirty="0">
+              <a:t>Client</a:t>
+            </a:r>
+            <a:endParaRPr lang="en-US" sz="1600" dirty="0">
               <a:solidFill>
                 <a:srgbClr val="002060"/>
               </a:solidFill>
@@ -3896,27 +3951,19 @@
       </p:sp>
       <p:sp>
         <p:nvSpPr>
-          <p:cNvPr id="9" name="Rectangle 8"/>
+          <p:cNvPr id="11" name="Rectangle 10"/>
           <p:cNvSpPr/>
           <p:nvPr/>
         </p:nvSpPr>
         <p:spPr>
           <a:xfrm>
-            <a:off x="1534668" y="2442972"/>
-            <a:ext cx="1676400" cy="1905000"/>
+            <a:off x="2286000" y="3352799"/>
+            <a:ext cx="1219200" cy="457200"/>
           </a:xfrm>
           <a:prstGeom prst="rect">
             <a:avLst/>
           </a:prstGeom>
           <a:noFill/>
-          <a:ln>
-            <a:solidFill>
-              <a:schemeClr val="accent1">
-                <a:shade val="50000"/>
-              </a:schemeClr>
-            </a:solidFill>
-            <a:prstDash val="solid"/>
-          </a:ln>
         </p:spPr>
         <p:style>
           <a:lnRef idx="2">
@@ -3939,20 +3986,32 @@
           <a:lstStyle/>
           <a:p>
             <a:pPr algn="ctr"/>
-            <a:endParaRPr lang="en-US" dirty="0"/>
-          </a:p>
-        </p:txBody>
-      </p:sp>
-      <p:sp>
-        <p:nvSpPr>
-          <p:cNvPr id="10" name="Rectangle 9"/>
+            <a:r>
+              <a:rPr lang="en-US" sz="1200" b="1" dirty="0" smtClean="0">
+                <a:solidFill>
+                  <a:srgbClr val="002060"/>
+                </a:solidFill>
+              </a:rPr>
+              <a:t>Shard</a:t>
+            </a:r>
+            <a:endParaRPr lang="en-US" sz="1600" b="1" dirty="0">
+              <a:solidFill>
+                <a:srgbClr val="002060"/>
+              </a:solidFill>
+            </a:endParaRPr>
+          </a:p>
+        </p:txBody>
+      </p:sp>
+      <p:sp>
+        <p:nvSpPr>
+          <p:cNvPr id="17" name="Rectangle 16"/>
           <p:cNvSpPr/>
           <p:nvPr/>
         </p:nvSpPr>
         <p:spPr>
           <a:xfrm>
-            <a:off x="1763268" y="2846832"/>
-            <a:ext cx="1219200" cy="457200"/>
+            <a:off x="990600" y="3428997"/>
+            <a:ext cx="782574" cy="304801"/>
           </a:xfrm>
           <a:prstGeom prst="rect">
             <a:avLst/>
@@ -3981,14 +4040,14 @@
           <a:p>
             <a:pPr algn="ctr"/>
             <a:r>
-              <a:rPr lang="en-US" sz="1100" dirty="0" smtClean="0">
+              <a:rPr lang="en-US" sz="1200" dirty="0" smtClean="0">
                 <a:solidFill>
                   <a:srgbClr val="002060"/>
                 </a:solidFill>
               </a:rPr>
-              <a:t>MemDB Client</a:t>
-            </a:r>
-            <a:endParaRPr lang="en-US" sz="1400" dirty="0">
+              <a:t>Replica</a:t>
+            </a:r>
+            <a:endParaRPr lang="en-US" sz="1600" dirty="0">
               <a:solidFill>
                 <a:srgbClr val="002060"/>
               </a:solidFill>
@@ -3998,13 +4057,13 @@
       </p:sp>
       <p:sp>
         <p:nvSpPr>
-          <p:cNvPr id="11" name="Rectangle 10"/>
+          <p:cNvPr id="21" name="Rectangle 20"/>
           <p:cNvSpPr/>
           <p:nvPr/>
         </p:nvSpPr>
         <p:spPr>
           <a:xfrm>
-            <a:off x="1763268" y="3581400"/>
+            <a:off x="4000500" y="3352799"/>
             <a:ext cx="1219200" cy="457200"/>
           </a:xfrm>
           <a:prstGeom prst="rect">
@@ -4034,14 +4093,1392 @@
           <a:p>
             <a:pPr algn="ctr"/>
             <a:r>
-              <a:rPr lang="en-US" sz="1100" dirty="0" smtClean="0">
+              <a:rPr lang="en-US" sz="1200" b="1" dirty="0" smtClean="0">
+                <a:solidFill>
+                  <a:srgbClr val="002060"/>
+                </a:solidFill>
+              </a:rPr>
+              <a:t>Shard</a:t>
+            </a:r>
+            <a:endParaRPr lang="en-US" sz="1600" b="1" dirty="0">
+              <a:solidFill>
+                <a:srgbClr val="002060"/>
+              </a:solidFill>
+            </a:endParaRPr>
+          </a:p>
+        </p:txBody>
+      </p:sp>
+      <p:sp>
+        <p:nvSpPr>
+          <p:cNvPr id="25" name="Rectangle 24"/>
+          <p:cNvSpPr/>
+          <p:nvPr/>
+        </p:nvSpPr>
+        <p:spPr>
+          <a:xfrm>
+            <a:off x="5747004" y="3352799"/>
+            <a:ext cx="1219200" cy="457200"/>
+          </a:xfrm>
+          <a:prstGeom prst="rect">
+            <a:avLst/>
+          </a:prstGeom>
+          <a:noFill/>
+        </p:spPr>
+        <p:style>
+          <a:lnRef idx="2">
+            <a:schemeClr val="accent1">
+              <a:shade val="50000"/>
+            </a:schemeClr>
+          </a:lnRef>
+          <a:fillRef idx="1">
+            <a:schemeClr val="accent1"/>
+          </a:fillRef>
+          <a:effectRef idx="0">
+            <a:schemeClr val="accent1"/>
+          </a:effectRef>
+          <a:fontRef idx="minor">
+            <a:schemeClr val="lt1"/>
+          </a:fontRef>
+        </p:style>
+        <p:txBody>
+          <a:bodyPr rtlCol="0" anchor="ctr"/>
+          <a:lstStyle/>
+          <a:p>
+            <a:pPr algn="ctr"/>
+            <a:r>
+              <a:rPr lang="en-US" sz="1200" b="1" dirty="0" smtClean="0">
+                <a:solidFill>
+                  <a:srgbClr val="002060"/>
+                </a:solidFill>
+              </a:rPr>
+              <a:t>Shard</a:t>
+            </a:r>
+            <a:endParaRPr lang="en-US" sz="1600" b="1" dirty="0">
+              <a:solidFill>
+                <a:srgbClr val="002060"/>
+              </a:solidFill>
+            </a:endParaRPr>
+          </a:p>
+        </p:txBody>
+      </p:sp>
+      <p:cxnSp>
+        <p:nvCxnSpPr>
+          <p:cNvPr id="30" name="Straight Arrow Connector 29"/>
+          <p:cNvCxnSpPr>
+            <a:stCxn id="11" idx="1"/>
+            <a:endCxn id="17" idx="3"/>
+          </p:cNvCxnSpPr>
+          <p:nvPr/>
+        </p:nvCxnSpPr>
+        <p:spPr>
+          <a:xfrm flipH="1" flipV="1">
+            <a:off x="1773174" y="3581398"/>
+            <a:ext cx="512826" cy="1"/>
+          </a:xfrm>
+          <a:prstGeom prst="straightConnector1">
+            <a:avLst/>
+          </a:prstGeom>
+          <a:ln>
+            <a:tailEnd type="arrow"/>
+          </a:ln>
+        </p:spPr>
+        <p:style>
+          <a:lnRef idx="1">
+            <a:schemeClr val="accent1"/>
+          </a:lnRef>
+          <a:fillRef idx="0">
+            <a:schemeClr val="accent1"/>
+          </a:fillRef>
+          <a:effectRef idx="0">
+            <a:schemeClr val="accent1"/>
+          </a:effectRef>
+          <a:fontRef idx="minor">
+            <a:schemeClr val="tx1"/>
+          </a:fontRef>
+        </p:style>
+      </p:cxnSp>
+      <p:cxnSp>
+        <p:nvCxnSpPr>
+          <p:cNvPr id="34" name="Straight Arrow Connector 33"/>
+          <p:cNvCxnSpPr>
+            <a:stCxn id="25" idx="3"/>
+            <a:endCxn id="73" idx="1"/>
+          </p:cNvCxnSpPr>
+          <p:nvPr/>
+        </p:nvCxnSpPr>
+        <p:spPr>
+          <a:xfrm>
+            <a:off x="6966204" y="3581399"/>
+            <a:ext cx="501396" cy="0"/>
+          </a:xfrm>
+          <a:prstGeom prst="straightConnector1">
+            <a:avLst/>
+          </a:prstGeom>
+          <a:ln>
+            <a:tailEnd type="arrow"/>
+          </a:ln>
+        </p:spPr>
+        <p:style>
+          <a:lnRef idx="1">
+            <a:schemeClr val="accent1"/>
+          </a:lnRef>
+          <a:fillRef idx="0">
+            <a:schemeClr val="accent1"/>
+          </a:fillRef>
+          <a:effectRef idx="0">
+            <a:schemeClr val="accent1"/>
+          </a:effectRef>
+          <a:fontRef idx="minor">
+            <a:schemeClr val="tx1"/>
+          </a:fontRef>
+        </p:style>
+      </p:cxnSp>
+      <p:sp>
+        <p:nvSpPr>
+          <p:cNvPr id="39" name="Rectangle 38"/>
+          <p:cNvSpPr/>
+          <p:nvPr/>
+        </p:nvSpPr>
+        <p:spPr>
+          <a:xfrm>
+            <a:off x="2286000" y="4768916"/>
+            <a:ext cx="1219200" cy="793684"/>
+          </a:xfrm>
+          <a:prstGeom prst="rect">
+            <a:avLst/>
+          </a:prstGeom>
+          <a:noFill/>
+          <a:ln>
+            <a:prstDash val="sysDash"/>
+          </a:ln>
+        </p:spPr>
+        <p:style>
+          <a:lnRef idx="2">
+            <a:schemeClr val="accent1">
+              <a:shade val="50000"/>
+            </a:schemeClr>
+          </a:lnRef>
+          <a:fillRef idx="1">
+            <a:schemeClr val="accent1"/>
+          </a:fillRef>
+          <a:effectRef idx="0">
+            <a:schemeClr val="accent1"/>
+          </a:effectRef>
+          <a:fontRef idx="minor">
+            <a:schemeClr val="lt1"/>
+          </a:fontRef>
+        </p:style>
+        <p:txBody>
+          <a:bodyPr rtlCol="0" anchor="ctr"/>
+          <a:lstStyle/>
+          <a:p>
+            <a:pPr algn="ctr"/>
+            <a:r>
+              <a:rPr lang="en-US" sz="1200" b="1" dirty="0" smtClean="0">
+                <a:solidFill>
+                  <a:srgbClr val="002060"/>
+                </a:solidFill>
+              </a:rPr>
+              <a:t>Backend Storage</a:t>
+            </a:r>
+          </a:p>
+          <a:p>
+            <a:pPr algn="ctr"/>
+            <a:r>
+              <a:rPr lang="en-US" sz="1200" dirty="0" smtClean="0">
+                <a:solidFill>
+                  <a:srgbClr val="002060"/>
+                </a:solidFill>
+              </a:rPr>
+              <a:t>(</a:t>
+            </a:r>
+            <a:r>
+              <a:rPr lang="en-US" sz="1200" dirty="0" err="1" smtClean="0">
+                <a:solidFill>
+                  <a:srgbClr val="002060"/>
+                </a:solidFill>
+              </a:rPr>
+              <a:t>MongoDB</a:t>
+            </a:r>
+            <a:r>
+              <a:rPr lang="en-US" sz="1200" dirty="0" smtClean="0">
+                <a:solidFill>
+                  <a:srgbClr val="002060"/>
+                </a:solidFill>
+              </a:rPr>
+              <a:t>)</a:t>
+            </a:r>
+            <a:endParaRPr lang="en-US" sz="1600" dirty="0">
+              <a:solidFill>
+                <a:srgbClr val="002060"/>
+              </a:solidFill>
+            </a:endParaRPr>
+          </a:p>
+        </p:txBody>
+      </p:sp>
+      <p:sp>
+        <p:nvSpPr>
+          <p:cNvPr id="40" name="Rectangle 39"/>
+          <p:cNvSpPr/>
+          <p:nvPr/>
+        </p:nvSpPr>
+        <p:spPr>
+          <a:xfrm>
+            <a:off x="4000500" y="4768916"/>
+            <a:ext cx="1219200" cy="793684"/>
+          </a:xfrm>
+          <a:prstGeom prst="rect">
+            <a:avLst/>
+          </a:prstGeom>
+          <a:noFill/>
+          <a:ln>
+            <a:prstDash val="sysDash"/>
+          </a:ln>
+        </p:spPr>
+        <p:style>
+          <a:lnRef idx="2">
+            <a:schemeClr val="accent1">
+              <a:shade val="50000"/>
+            </a:schemeClr>
+          </a:lnRef>
+          <a:fillRef idx="1">
+            <a:schemeClr val="accent1"/>
+          </a:fillRef>
+          <a:effectRef idx="0">
+            <a:schemeClr val="accent1"/>
+          </a:effectRef>
+          <a:fontRef idx="minor">
+            <a:schemeClr val="lt1"/>
+          </a:fontRef>
+        </p:style>
+        <p:txBody>
+          <a:bodyPr rtlCol="0" anchor="ctr"/>
+          <a:lstStyle/>
+          <a:p>
+            <a:pPr algn="ctr"/>
+            <a:r>
+              <a:rPr lang="en-US" sz="1200" b="1" dirty="0" smtClean="0">
+                <a:solidFill>
+                  <a:srgbClr val="002060"/>
+                </a:solidFill>
+              </a:rPr>
+              <a:t>Global Locking</a:t>
+            </a:r>
+          </a:p>
+          <a:p>
+            <a:pPr algn="ctr"/>
+            <a:r>
+              <a:rPr lang="en-US" sz="1200" dirty="0" smtClean="0">
+                <a:solidFill>
+                  <a:srgbClr val="002060"/>
+                </a:solidFill>
+              </a:rPr>
+              <a:t>(</a:t>
+            </a:r>
+            <a:r>
+              <a:rPr lang="en-US" sz="1200" dirty="0" err="1" smtClean="0">
+                <a:solidFill>
+                  <a:srgbClr val="002060"/>
+                </a:solidFill>
+              </a:rPr>
+              <a:t>Redis</a:t>
+            </a:r>
+            <a:r>
+              <a:rPr lang="en-US" sz="1200" dirty="0" smtClean="0">
+                <a:solidFill>
+                  <a:srgbClr val="002060"/>
+                </a:solidFill>
+              </a:rPr>
+              <a:t>)</a:t>
+            </a:r>
+            <a:endParaRPr lang="en-US" sz="1600" dirty="0">
+              <a:solidFill>
+                <a:srgbClr val="002060"/>
+              </a:solidFill>
+            </a:endParaRPr>
+          </a:p>
+        </p:txBody>
+      </p:sp>
+      <p:cxnSp>
+        <p:nvCxnSpPr>
+          <p:cNvPr id="50" name="Straight Arrow Connector 49"/>
+          <p:cNvCxnSpPr>
+            <a:stCxn id="11" idx="2"/>
+          </p:cNvCxnSpPr>
+          <p:nvPr/>
+        </p:nvCxnSpPr>
+        <p:spPr>
+          <a:xfrm>
+            <a:off x="2895600" y="3809999"/>
+            <a:ext cx="0" cy="609600"/>
+          </a:xfrm>
+          <a:prstGeom prst="straightConnector1">
+            <a:avLst/>
+          </a:prstGeom>
+          <a:ln>
+            <a:headEnd type="arrow"/>
+            <a:tailEnd type="arrow"/>
+          </a:ln>
+        </p:spPr>
+        <p:style>
+          <a:lnRef idx="1">
+            <a:schemeClr val="accent1"/>
+          </a:lnRef>
+          <a:fillRef idx="0">
+            <a:schemeClr val="accent1"/>
+          </a:fillRef>
+          <a:effectRef idx="0">
+            <a:schemeClr val="accent1"/>
+          </a:effectRef>
+          <a:fontRef idx="minor">
+            <a:schemeClr val="tx1"/>
+          </a:fontRef>
+        </p:style>
+      </p:cxnSp>
+      <p:cxnSp>
+        <p:nvCxnSpPr>
+          <p:cNvPr id="52" name="Straight Arrow Connector 51"/>
+          <p:cNvCxnSpPr>
+            <a:stCxn id="21" idx="2"/>
+            <a:endCxn id="67" idx="0"/>
+          </p:cNvCxnSpPr>
+          <p:nvPr/>
+        </p:nvCxnSpPr>
+        <p:spPr>
+          <a:xfrm>
+            <a:off x="4610100" y="3809999"/>
+            <a:ext cx="0" cy="609600"/>
+          </a:xfrm>
+          <a:prstGeom prst="straightConnector1">
+            <a:avLst/>
+          </a:prstGeom>
+          <a:ln>
+            <a:headEnd type="arrow"/>
+            <a:tailEnd type="arrow"/>
+          </a:ln>
+        </p:spPr>
+        <p:style>
+          <a:lnRef idx="1">
+            <a:schemeClr val="accent1"/>
+          </a:lnRef>
+          <a:fillRef idx="0">
+            <a:schemeClr val="accent1"/>
+          </a:fillRef>
+          <a:effectRef idx="0">
+            <a:schemeClr val="accent1"/>
+          </a:effectRef>
+          <a:fontRef idx="minor">
+            <a:schemeClr val="tx1"/>
+          </a:fontRef>
+        </p:style>
+      </p:cxnSp>
+      <p:cxnSp>
+        <p:nvCxnSpPr>
+          <p:cNvPr id="54" name="Straight Arrow Connector 53"/>
+          <p:cNvCxnSpPr>
+            <a:endCxn id="25" idx="2"/>
+          </p:cNvCxnSpPr>
+          <p:nvPr/>
+        </p:nvCxnSpPr>
+        <p:spPr>
+          <a:xfrm flipV="1">
+            <a:off x="6356604" y="3809999"/>
+            <a:ext cx="0" cy="609600"/>
+          </a:xfrm>
+          <a:prstGeom prst="straightConnector1">
+            <a:avLst/>
+          </a:prstGeom>
+          <a:ln>
+            <a:headEnd type="arrow"/>
+            <a:tailEnd type="arrow"/>
+          </a:ln>
+        </p:spPr>
+        <p:style>
+          <a:lnRef idx="1">
+            <a:schemeClr val="accent1"/>
+          </a:lnRef>
+          <a:fillRef idx="0">
+            <a:schemeClr val="accent1"/>
+          </a:fillRef>
+          <a:effectRef idx="0">
+            <a:schemeClr val="accent1"/>
+          </a:effectRef>
+          <a:fontRef idx="minor">
+            <a:schemeClr val="tx1"/>
+          </a:fontRef>
+        </p:style>
+      </p:cxnSp>
+      <p:cxnSp>
+        <p:nvCxnSpPr>
+          <p:cNvPr id="81" name="Straight Arrow Connector 80"/>
+          <p:cNvCxnSpPr>
+            <a:endCxn id="11" idx="0"/>
+          </p:cNvCxnSpPr>
+          <p:nvPr/>
+        </p:nvCxnSpPr>
+        <p:spPr>
+          <a:xfrm>
+            <a:off x="2895599" y="2344415"/>
+            <a:ext cx="1" cy="1008384"/>
+          </a:xfrm>
+          <a:prstGeom prst="straightConnector1">
+            <a:avLst/>
+          </a:prstGeom>
+          <a:ln>
+            <a:tailEnd type="arrow"/>
+          </a:ln>
+        </p:spPr>
+        <p:style>
+          <a:lnRef idx="1">
+            <a:schemeClr val="accent1"/>
+          </a:lnRef>
+          <a:fillRef idx="0">
+            <a:schemeClr val="accent1"/>
+          </a:fillRef>
+          <a:effectRef idx="0">
+            <a:schemeClr val="accent1"/>
+          </a:effectRef>
+          <a:fontRef idx="minor">
+            <a:schemeClr val="tx1"/>
+          </a:fontRef>
+        </p:style>
+      </p:cxnSp>
+      <p:cxnSp>
+        <p:nvCxnSpPr>
+          <p:cNvPr id="83" name="Straight Arrow Connector 82"/>
+          <p:cNvCxnSpPr>
+            <a:stCxn id="4" idx="2"/>
+            <a:endCxn id="21" idx="0"/>
+          </p:cNvCxnSpPr>
+          <p:nvPr/>
+        </p:nvCxnSpPr>
+        <p:spPr>
+          <a:xfrm>
+            <a:off x="4610100" y="2344415"/>
+            <a:ext cx="0" cy="1008384"/>
+          </a:xfrm>
+          <a:prstGeom prst="straightConnector1">
+            <a:avLst/>
+          </a:prstGeom>
+          <a:ln>
+            <a:tailEnd type="arrow"/>
+          </a:ln>
+        </p:spPr>
+        <p:style>
+          <a:lnRef idx="1">
+            <a:schemeClr val="accent1"/>
+          </a:lnRef>
+          <a:fillRef idx="0">
+            <a:schemeClr val="accent1"/>
+          </a:fillRef>
+          <a:effectRef idx="0">
+            <a:schemeClr val="accent1"/>
+          </a:effectRef>
+          <a:fontRef idx="minor">
+            <a:schemeClr val="tx1"/>
+          </a:fontRef>
+        </p:style>
+      </p:cxnSp>
+      <p:cxnSp>
+        <p:nvCxnSpPr>
+          <p:cNvPr id="85" name="Straight Arrow Connector 84"/>
+          <p:cNvCxnSpPr>
+            <a:endCxn id="25" idx="0"/>
+          </p:cNvCxnSpPr>
+          <p:nvPr/>
+        </p:nvCxnSpPr>
+        <p:spPr>
+          <a:xfrm>
+            <a:off x="6356604" y="2344415"/>
+            <a:ext cx="0" cy="1008384"/>
+          </a:xfrm>
+          <a:prstGeom prst="straightConnector1">
+            <a:avLst/>
+          </a:prstGeom>
+          <a:ln>
+            <a:tailEnd type="arrow"/>
+          </a:ln>
+        </p:spPr>
+        <p:style>
+          <a:lnRef idx="1">
+            <a:schemeClr val="accent1"/>
+          </a:lnRef>
+          <a:fillRef idx="0">
+            <a:schemeClr val="accent1"/>
+          </a:fillRef>
+          <a:effectRef idx="0">
+            <a:schemeClr val="accent1"/>
+          </a:effectRef>
+          <a:fontRef idx="minor">
+            <a:schemeClr val="tx1"/>
+          </a:fontRef>
+        </p:style>
+      </p:cxnSp>
+      <p:sp>
+        <p:nvSpPr>
+          <p:cNvPr id="86" name="TextBox 85"/>
+          <p:cNvSpPr txBox="1"/>
+          <p:nvPr/>
+        </p:nvSpPr>
+        <p:spPr>
+          <a:xfrm>
+            <a:off x="2513742" y="2569464"/>
+            <a:ext cx="763715" cy="276999"/>
+          </a:xfrm>
+          <a:prstGeom prst="rect">
+            <a:avLst/>
+          </a:prstGeom>
+          <a:noFill/>
+        </p:spPr>
+        <p:txBody>
+          <a:bodyPr wrap="square" rtlCol="0">
+            <a:spAutoFit/>
+          </a:bodyPr>
+          <a:lstStyle/>
+          <a:p>
+            <a:r>
+              <a:rPr lang="en-US" sz="1200" dirty="0" smtClean="0"/>
+              <a:t>Routing</a:t>
+            </a:r>
+            <a:endParaRPr lang="en-US" sz="1200" dirty="0"/>
+          </a:p>
+        </p:txBody>
+      </p:sp>
+      <p:sp>
+        <p:nvSpPr>
+          <p:cNvPr id="87" name="TextBox 86"/>
+          <p:cNvSpPr txBox="1"/>
+          <p:nvPr/>
+        </p:nvSpPr>
+        <p:spPr>
+          <a:xfrm>
+            <a:off x="4228242" y="2557790"/>
+            <a:ext cx="763715" cy="276999"/>
+          </a:xfrm>
+          <a:prstGeom prst="rect">
+            <a:avLst/>
+          </a:prstGeom>
+          <a:noFill/>
+        </p:spPr>
+        <p:txBody>
+          <a:bodyPr wrap="square" rtlCol="0">
+            <a:spAutoFit/>
+          </a:bodyPr>
+          <a:lstStyle/>
+          <a:p>
+            <a:r>
+              <a:rPr lang="en-US" sz="1200" dirty="0" smtClean="0"/>
+              <a:t>Routing</a:t>
+            </a:r>
+            <a:endParaRPr lang="en-US" sz="1200" dirty="0"/>
+          </a:p>
+        </p:txBody>
+      </p:sp>
+      <p:sp>
+        <p:nvSpPr>
+          <p:cNvPr id="88" name="TextBox 87"/>
+          <p:cNvSpPr txBox="1"/>
+          <p:nvPr/>
+        </p:nvSpPr>
+        <p:spPr>
+          <a:xfrm>
+            <a:off x="5974746" y="2557790"/>
+            <a:ext cx="763715" cy="276999"/>
+          </a:xfrm>
+          <a:prstGeom prst="rect">
+            <a:avLst/>
+          </a:prstGeom>
+          <a:noFill/>
+        </p:spPr>
+        <p:txBody>
+          <a:bodyPr wrap="square" rtlCol="0">
+            <a:spAutoFit/>
+          </a:bodyPr>
+          <a:lstStyle/>
+          <a:p>
+            <a:r>
+              <a:rPr lang="en-US" sz="1200" dirty="0" smtClean="0"/>
+              <a:t>Routing</a:t>
+            </a:r>
+            <a:endParaRPr lang="en-US" sz="1200" dirty="0"/>
+          </a:p>
+        </p:txBody>
+      </p:sp>
+      <p:sp>
+        <p:nvSpPr>
+          <p:cNvPr id="194" name="TextBox 193"/>
+          <p:cNvSpPr txBox="1"/>
+          <p:nvPr/>
+        </p:nvSpPr>
+        <p:spPr>
+          <a:xfrm>
+            <a:off x="3985260" y="6016823"/>
+            <a:ext cx="1371600" cy="307777"/>
+          </a:xfrm>
+          <a:prstGeom prst="rect">
+            <a:avLst/>
+          </a:prstGeom>
+          <a:noFill/>
+        </p:spPr>
+        <p:txBody>
+          <a:bodyPr wrap="square" rtlCol="0">
+            <a:spAutoFit/>
+          </a:bodyPr>
+          <a:lstStyle/>
+          <a:p>
+            <a:r>
+              <a:rPr lang="en-US" sz="1400" b="1" dirty="0" err="1" smtClean="0"/>
+              <a:t>MemDB</a:t>
+            </a:r>
+            <a:r>
+              <a:rPr lang="en-US" sz="1400" b="1" dirty="0" smtClean="0"/>
+              <a:t> Cluster</a:t>
+            </a:r>
+            <a:endParaRPr lang="en-US" sz="1400" b="1" dirty="0"/>
+          </a:p>
+        </p:txBody>
+      </p:sp>
+      <p:sp>
+        <p:nvSpPr>
+          <p:cNvPr id="51" name="Rectangle 50"/>
+          <p:cNvSpPr/>
+          <p:nvPr/>
+        </p:nvSpPr>
+        <p:spPr>
+          <a:xfrm>
+            <a:off x="5747004" y="4768916"/>
+            <a:ext cx="1219200" cy="793684"/>
+          </a:xfrm>
+          <a:prstGeom prst="rect">
+            <a:avLst/>
+          </a:prstGeom>
+          <a:noFill/>
+          <a:ln>
+            <a:prstDash val="sysDash"/>
+          </a:ln>
+        </p:spPr>
+        <p:style>
+          <a:lnRef idx="2">
+            <a:schemeClr val="accent1">
+              <a:shade val="50000"/>
+            </a:schemeClr>
+          </a:lnRef>
+          <a:fillRef idx="1">
+            <a:schemeClr val="accent1"/>
+          </a:fillRef>
+          <a:effectRef idx="0">
+            <a:schemeClr val="accent1"/>
+          </a:effectRef>
+          <a:fontRef idx="minor">
+            <a:schemeClr val="lt1"/>
+          </a:fontRef>
+        </p:style>
+        <p:txBody>
+          <a:bodyPr rtlCol="0" anchor="ctr"/>
+          <a:lstStyle/>
+          <a:p>
+            <a:pPr algn="ctr"/>
+            <a:r>
+              <a:rPr lang="en-US" sz="1200" b="1" dirty="0" smtClean="0">
+                <a:solidFill>
+                  <a:srgbClr val="002060"/>
+                </a:solidFill>
+              </a:rPr>
+              <a:t>Global Event</a:t>
+            </a:r>
+          </a:p>
+          <a:p>
+            <a:pPr algn="ctr"/>
+            <a:r>
+              <a:rPr lang="en-US" sz="1200" dirty="0" smtClean="0">
+                <a:solidFill>
+                  <a:srgbClr val="002060"/>
+                </a:solidFill>
+              </a:rPr>
+              <a:t>(</a:t>
+            </a:r>
+            <a:r>
+              <a:rPr lang="en-US" sz="1200" dirty="0" err="1" smtClean="0">
+                <a:solidFill>
+                  <a:srgbClr val="002060"/>
+                </a:solidFill>
+              </a:rPr>
+              <a:t>Redis</a:t>
+            </a:r>
+            <a:r>
+              <a:rPr lang="en-US" sz="1200" dirty="0" smtClean="0">
+                <a:solidFill>
+                  <a:srgbClr val="002060"/>
+                </a:solidFill>
+              </a:rPr>
+              <a:t>)</a:t>
+            </a:r>
+            <a:endParaRPr lang="en-US" sz="1600" dirty="0">
+              <a:solidFill>
+                <a:srgbClr val="002060"/>
+              </a:solidFill>
+            </a:endParaRPr>
+          </a:p>
+        </p:txBody>
+      </p:sp>
+      <p:sp>
+        <p:nvSpPr>
+          <p:cNvPr id="67" name="Rectangle 66"/>
+          <p:cNvSpPr/>
+          <p:nvPr/>
+        </p:nvSpPr>
+        <p:spPr>
+          <a:xfrm>
+            <a:off x="1849374" y="4419599"/>
+            <a:ext cx="5521452" cy="1371601"/>
+          </a:xfrm>
+          <a:prstGeom prst="rect">
+            <a:avLst/>
+          </a:prstGeom>
+          <a:noFill/>
+          <a:ln w="19050">
+            <a:prstDash val="sysDash"/>
+          </a:ln>
+        </p:spPr>
+        <p:style>
+          <a:lnRef idx="2">
+            <a:schemeClr val="accent1">
+              <a:shade val="50000"/>
+            </a:schemeClr>
+          </a:lnRef>
+          <a:fillRef idx="1">
+            <a:schemeClr val="accent1"/>
+          </a:fillRef>
+          <a:effectRef idx="0">
+            <a:schemeClr val="accent1"/>
+          </a:effectRef>
+          <a:fontRef idx="minor">
+            <a:schemeClr val="lt1"/>
+          </a:fontRef>
+        </p:style>
+        <p:txBody>
+          <a:bodyPr rtlCol="0" anchor="ctr"/>
+          <a:lstStyle/>
+          <a:p>
+            <a:pPr algn="ctr"/>
+            <a:endParaRPr lang="en-US" sz="2000"/>
+          </a:p>
+        </p:txBody>
+      </p:sp>
+      <p:sp>
+        <p:nvSpPr>
+          <p:cNvPr id="80" name="TextBox 79"/>
+          <p:cNvSpPr txBox="1"/>
+          <p:nvPr/>
+        </p:nvSpPr>
+        <p:spPr>
+          <a:xfrm>
+            <a:off x="3970018" y="4453768"/>
+            <a:ext cx="1280160" cy="276999"/>
+          </a:xfrm>
+          <a:prstGeom prst="rect">
+            <a:avLst/>
+          </a:prstGeom>
+          <a:noFill/>
+        </p:spPr>
+        <p:txBody>
+          <a:bodyPr wrap="square" rtlCol="0">
+            <a:spAutoFit/>
+          </a:bodyPr>
+          <a:lstStyle/>
+          <a:p>
+            <a:r>
+              <a:rPr lang="en-US" sz="1200" dirty="0" smtClean="0"/>
+              <a:t>Global Services</a:t>
+            </a:r>
+            <a:endParaRPr lang="en-US" sz="1200" dirty="0"/>
+          </a:p>
+        </p:txBody>
+      </p:sp>
+      <p:sp>
+        <p:nvSpPr>
+          <p:cNvPr id="72" name="Rectangle 71"/>
+          <p:cNvSpPr/>
+          <p:nvPr/>
+        </p:nvSpPr>
+        <p:spPr>
+          <a:xfrm>
+            <a:off x="990600" y="3944105"/>
+            <a:ext cx="782574" cy="304801"/>
+          </a:xfrm>
+          <a:prstGeom prst="rect">
+            <a:avLst/>
+          </a:prstGeom>
+          <a:noFill/>
+        </p:spPr>
+        <p:style>
+          <a:lnRef idx="2">
+            <a:schemeClr val="accent1">
+              <a:shade val="50000"/>
+            </a:schemeClr>
+          </a:lnRef>
+          <a:fillRef idx="1">
+            <a:schemeClr val="accent1"/>
+          </a:fillRef>
+          <a:effectRef idx="0">
+            <a:schemeClr val="accent1"/>
+          </a:effectRef>
+          <a:fontRef idx="minor">
+            <a:schemeClr val="lt1"/>
+          </a:fontRef>
+        </p:style>
+        <p:txBody>
+          <a:bodyPr rtlCol="0" anchor="ctr"/>
+          <a:lstStyle/>
+          <a:p>
+            <a:pPr algn="ctr"/>
+            <a:r>
+              <a:rPr lang="en-US" sz="1200" dirty="0" smtClean="0">
+                <a:solidFill>
+                  <a:srgbClr val="002060"/>
+                </a:solidFill>
+              </a:rPr>
+              <a:t>Replica</a:t>
+            </a:r>
+            <a:endParaRPr lang="en-US" sz="1600" dirty="0">
+              <a:solidFill>
+                <a:srgbClr val="002060"/>
+              </a:solidFill>
+            </a:endParaRPr>
+          </a:p>
+        </p:txBody>
+      </p:sp>
+      <p:sp>
+        <p:nvSpPr>
+          <p:cNvPr id="73" name="Rectangle 72"/>
+          <p:cNvSpPr/>
+          <p:nvPr/>
+        </p:nvSpPr>
+        <p:spPr>
+          <a:xfrm>
+            <a:off x="7467600" y="3428998"/>
+            <a:ext cx="782574" cy="304801"/>
+          </a:xfrm>
+          <a:prstGeom prst="rect">
+            <a:avLst/>
+          </a:prstGeom>
+          <a:noFill/>
+        </p:spPr>
+        <p:style>
+          <a:lnRef idx="2">
+            <a:schemeClr val="accent1">
+              <a:shade val="50000"/>
+            </a:schemeClr>
+          </a:lnRef>
+          <a:fillRef idx="1">
+            <a:schemeClr val="accent1"/>
+          </a:fillRef>
+          <a:effectRef idx="0">
+            <a:schemeClr val="accent1"/>
+          </a:effectRef>
+          <a:fontRef idx="minor">
+            <a:schemeClr val="lt1"/>
+          </a:fontRef>
+        </p:style>
+        <p:txBody>
+          <a:bodyPr rtlCol="0" anchor="ctr"/>
+          <a:lstStyle/>
+          <a:p>
+            <a:pPr algn="ctr"/>
+            <a:r>
+              <a:rPr lang="en-US" sz="1200" dirty="0" smtClean="0">
+                <a:solidFill>
+                  <a:srgbClr val="002060"/>
+                </a:solidFill>
+              </a:rPr>
+              <a:t>Replica</a:t>
+            </a:r>
+            <a:endParaRPr lang="en-US" sz="1600" dirty="0">
+              <a:solidFill>
+                <a:srgbClr val="002060"/>
+              </a:solidFill>
+            </a:endParaRPr>
+          </a:p>
+        </p:txBody>
+      </p:sp>
+      <p:cxnSp>
+        <p:nvCxnSpPr>
+          <p:cNvPr id="75" name="Elbow Connector 74"/>
+          <p:cNvCxnSpPr>
+            <a:stCxn id="21" idx="1"/>
+            <a:endCxn id="72" idx="3"/>
+          </p:cNvCxnSpPr>
+          <p:nvPr/>
+        </p:nvCxnSpPr>
+        <p:spPr>
+          <a:xfrm rot="10800000" flipV="1">
+            <a:off x="1773174" y="3581398"/>
+            <a:ext cx="2227326" cy="515107"/>
+          </a:xfrm>
+          <a:prstGeom prst="bentConnector3">
+            <a:avLst>
+              <a:gd name="adj1" fmla="val 15104"/>
+            </a:avLst>
+          </a:prstGeom>
+          <a:ln>
+            <a:tailEnd type="arrow"/>
+          </a:ln>
+        </p:spPr>
+        <p:style>
+          <a:lnRef idx="1">
+            <a:schemeClr val="accent1"/>
+          </a:lnRef>
+          <a:fillRef idx="0">
+            <a:schemeClr val="accent1"/>
+          </a:fillRef>
+          <a:effectRef idx="0">
+            <a:schemeClr val="accent1"/>
+          </a:effectRef>
+          <a:fontRef idx="minor">
+            <a:schemeClr val="tx1"/>
+          </a:fontRef>
+        </p:style>
+      </p:cxnSp>
+      <p:sp>
+        <p:nvSpPr>
+          <p:cNvPr id="90" name="TextBox 89"/>
+          <p:cNvSpPr txBox="1"/>
+          <p:nvPr/>
+        </p:nvSpPr>
+        <p:spPr>
+          <a:xfrm>
+            <a:off x="4000499" y="2057400"/>
+            <a:ext cx="1276349" cy="276999"/>
+          </a:xfrm>
+          <a:prstGeom prst="rect">
+            <a:avLst/>
+          </a:prstGeom>
+          <a:noFill/>
+        </p:spPr>
+        <p:txBody>
+          <a:bodyPr wrap="square" rtlCol="0">
+            <a:spAutoFit/>
+          </a:bodyPr>
+          <a:lstStyle/>
+          <a:p>
+            <a:r>
+              <a:rPr lang="en-US" sz="1200" dirty="0" smtClean="0"/>
+              <a:t>Frontend servers</a:t>
+            </a:r>
+            <a:endParaRPr lang="en-US" sz="1200" dirty="0"/>
+          </a:p>
+        </p:txBody>
+      </p:sp>
+      <p:sp>
+        <p:nvSpPr>
+          <p:cNvPr id="101" name="TextBox 100"/>
+          <p:cNvSpPr txBox="1"/>
+          <p:nvPr/>
+        </p:nvSpPr>
+        <p:spPr>
+          <a:xfrm>
+            <a:off x="3062285" y="452735"/>
+            <a:ext cx="3095626" cy="461665"/>
+          </a:xfrm>
+          <a:prstGeom prst="rect">
+            <a:avLst/>
+          </a:prstGeom>
+          <a:noFill/>
+        </p:spPr>
+        <p:txBody>
+          <a:bodyPr wrap="square" rtlCol="0">
+            <a:spAutoFit/>
+          </a:bodyPr>
+          <a:lstStyle/>
+          <a:p>
+            <a:r>
+              <a:rPr lang="en-US" sz="2400" b="1" dirty="0" err="1" smtClean="0"/>
+              <a:t>MemDB</a:t>
+            </a:r>
+            <a:r>
+              <a:rPr lang="en-US" sz="2400" b="1" dirty="0" smtClean="0"/>
+              <a:t> Architecture</a:t>
+            </a:r>
+            <a:endParaRPr lang="en-US" sz="2400" b="1" dirty="0"/>
+          </a:p>
+        </p:txBody>
+      </p:sp>
+    </p:spTree>
+    <p:extLst>
+      <p:ext uri="{BB962C8B-B14F-4D97-AF65-F5344CB8AC3E}">
+        <p14:creationId xmlns:p14="http://schemas.microsoft.com/office/powerpoint/2010/main" val="1179418900"/>
+      </p:ext>
+    </p:extLst>
+  </p:cSld>
+  <p:clrMapOvr>
+    <a:masterClrMapping/>
+  </p:clrMapOvr>
+</p:sld>
+</file>
+
+<file path=ppt/slides/slide2.xml><?xml version="1.0" encoding="utf-8"?>
+<p:sld xmlns:a="http://schemas.openxmlformats.org/drawingml/2006/main" xmlns:r="http://schemas.openxmlformats.org/officeDocument/2006/relationships" xmlns:p="http://schemas.openxmlformats.org/presentationml/2006/main">
+  <p:cSld>
+    <p:spTree>
+      <p:nvGrpSpPr>
+        <p:cNvPr id="1" name=""/>
+        <p:cNvGrpSpPr/>
+        <p:nvPr/>
+      </p:nvGrpSpPr>
+      <p:grpSpPr>
+        <a:xfrm>
+          <a:off x="0" y="0"/>
+          <a:ext cx="0" cy="0"/>
+          <a:chOff x="0" y="0"/>
+          <a:chExt cx="0" cy="0"/>
+        </a:xfrm>
+      </p:grpSpPr>
+      <p:sp>
+        <p:nvSpPr>
+          <p:cNvPr id="166" name="Rectangle 165"/>
+          <p:cNvSpPr/>
+          <p:nvPr/>
+        </p:nvSpPr>
+        <p:spPr>
+          <a:xfrm>
+            <a:off x="457200" y="2396498"/>
+            <a:ext cx="8229600" cy="3928102"/>
+          </a:xfrm>
+          <a:prstGeom prst="rect">
+            <a:avLst/>
+          </a:prstGeom>
+          <a:noFill/>
+          <a:ln>
+            <a:prstDash val="sysDash"/>
+          </a:ln>
+        </p:spPr>
+        <p:style>
+          <a:lnRef idx="2">
+            <a:schemeClr val="accent1">
+              <a:shade val="50000"/>
+            </a:schemeClr>
+          </a:lnRef>
+          <a:fillRef idx="1">
+            <a:schemeClr val="accent1"/>
+          </a:fillRef>
+          <a:effectRef idx="0">
+            <a:schemeClr val="accent1"/>
+          </a:effectRef>
+          <a:fontRef idx="minor">
+            <a:schemeClr val="lt1"/>
+          </a:fontRef>
+        </p:style>
+        <p:txBody>
+          <a:bodyPr rtlCol="0" anchor="ctr"/>
+          <a:lstStyle/>
+          <a:p>
+            <a:pPr algn="ctr"/>
+            <a:endParaRPr lang="en-US" sz="2000"/>
+          </a:p>
+        </p:txBody>
+      </p:sp>
+      <p:sp>
+        <p:nvSpPr>
+          <p:cNvPr id="4" name="Rectangle 3"/>
+          <p:cNvSpPr/>
+          <p:nvPr/>
+        </p:nvSpPr>
+        <p:spPr>
+          <a:xfrm>
+            <a:off x="1524000" y="1109990"/>
+            <a:ext cx="6019800" cy="896615"/>
+          </a:xfrm>
+          <a:prstGeom prst="rect">
+            <a:avLst/>
+          </a:prstGeom>
+          <a:noFill/>
+          <a:ln>
+            <a:prstDash val="sysDash"/>
+          </a:ln>
+        </p:spPr>
+        <p:style>
+          <a:lnRef idx="2">
+            <a:schemeClr val="accent1">
+              <a:shade val="50000"/>
+            </a:schemeClr>
+          </a:lnRef>
+          <a:fillRef idx="1">
+            <a:schemeClr val="accent1"/>
+          </a:fillRef>
+          <a:effectRef idx="0">
+            <a:schemeClr val="accent1"/>
+          </a:effectRef>
+          <a:fontRef idx="minor">
+            <a:schemeClr val="lt1"/>
+          </a:fontRef>
+        </p:style>
+        <p:txBody>
+          <a:bodyPr rtlCol="0" anchor="ctr"/>
+          <a:lstStyle/>
+          <a:p>
+            <a:pPr algn="ctr"/>
+            <a:endParaRPr lang="en-US" sz="2000"/>
+          </a:p>
+        </p:txBody>
+      </p:sp>
+      <p:sp>
+        <p:nvSpPr>
+          <p:cNvPr id="6" name="Rectangle 5"/>
+          <p:cNvSpPr/>
+          <p:nvPr/>
+        </p:nvSpPr>
+        <p:spPr>
+          <a:xfrm>
+            <a:off x="3924300" y="1262390"/>
+            <a:ext cx="1219200" cy="457200"/>
+          </a:xfrm>
+          <a:prstGeom prst="rect">
+            <a:avLst/>
+          </a:prstGeom>
+          <a:noFill/>
+        </p:spPr>
+        <p:style>
+          <a:lnRef idx="2">
+            <a:schemeClr val="accent1">
+              <a:shade val="50000"/>
+            </a:schemeClr>
+          </a:lnRef>
+          <a:fillRef idx="1">
+            <a:schemeClr val="accent1"/>
+          </a:fillRef>
+          <a:effectRef idx="0">
+            <a:schemeClr val="accent1"/>
+          </a:effectRef>
+          <a:fontRef idx="minor">
+            <a:schemeClr val="lt1"/>
+          </a:fontRef>
+        </p:style>
+        <p:txBody>
+          <a:bodyPr rtlCol="0" anchor="ctr"/>
+          <a:lstStyle/>
+          <a:p>
+            <a:pPr algn="ctr"/>
+            <a:r>
+              <a:rPr lang="en-US" sz="1200" dirty="0" smtClean="0">
+                <a:solidFill>
+                  <a:srgbClr val="002060"/>
+                </a:solidFill>
+              </a:rPr>
+              <a:t>Frontend Server</a:t>
+            </a:r>
+            <a:endParaRPr lang="en-US" sz="1600" dirty="0">
+              <a:solidFill>
+                <a:srgbClr val="002060"/>
+              </a:solidFill>
+            </a:endParaRPr>
+          </a:p>
+        </p:txBody>
+      </p:sp>
+      <p:sp>
+        <p:nvSpPr>
+          <p:cNvPr id="7" name="Rectangle 6"/>
+          <p:cNvSpPr/>
+          <p:nvPr/>
+        </p:nvSpPr>
+        <p:spPr>
+          <a:xfrm>
+            <a:off x="2209800" y="1262390"/>
+            <a:ext cx="1219200" cy="457200"/>
+          </a:xfrm>
+          <a:prstGeom prst="rect">
+            <a:avLst/>
+          </a:prstGeom>
+          <a:noFill/>
+        </p:spPr>
+        <p:style>
+          <a:lnRef idx="2">
+            <a:schemeClr val="accent1">
+              <a:shade val="50000"/>
+            </a:schemeClr>
+          </a:lnRef>
+          <a:fillRef idx="1">
+            <a:schemeClr val="accent1"/>
+          </a:fillRef>
+          <a:effectRef idx="0">
+            <a:schemeClr val="accent1"/>
+          </a:effectRef>
+          <a:fontRef idx="minor">
+            <a:schemeClr val="lt1"/>
+          </a:fontRef>
+        </p:style>
+        <p:txBody>
+          <a:bodyPr rtlCol="0" anchor="ctr"/>
+          <a:lstStyle/>
+          <a:p>
+            <a:pPr algn="ctr"/>
+            <a:r>
+              <a:rPr lang="en-US" sz="1200" dirty="0" smtClean="0">
+                <a:solidFill>
+                  <a:srgbClr val="002060"/>
+                </a:solidFill>
+              </a:rPr>
+              <a:t>Frontend Server</a:t>
+            </a:r>
+            <a:endParaRPr lang="en-US" sz="1600" dirty="0">
+              <a:solidFill>
+                <a:srgbClr val="002060"/>
+              </a:solidFill>
+            </a:endParaRPr>
+          </a:p>
+        </p:txBody>
+      </p:sp>
+      <p:sp>
+        <p:nvSpPr>
+          <p:cNvPr id="8" name="Rectangle 7"/>
+          <p:cNvSpPr/>
+          <p:nvPr/>
+        </p:nvSpPr>
+        <p:spPr>
+          <a:xfrm>
+            <a:off x="5638800" y="1262390"/>
+            <a:ext cx="1219200" cy="457200"/>
+          </a:xfrm>
+          <a:prstGeom prst="rect">
+            <a:avLst/>
+          </a:prstGeom>
+          <a:noFill/>
+        </p:spPr>
+        <p:style>
+          <a:lnRef idx="2">
+            <a:schemeClr val="accent1">
+              <a:shade val="50000"/>
+            </a:schemeClr>
+          </a:lnRef>
+          <a:fillRef idx="1">
+            <a:schemeClr val="accent1"/>
+          </a:fillRef>
+          <a:effectRef idx="0">
+            <a:schemeClr val="accent1"/>
+          </a:effectRef>
+          <a:fontRef idx="minor">
+            <a:schemeClr val="lt1"/>
+          </a:fontRef>
+        </p:style>
+        <p:txBody>
+          <a:bodyPr rtlCol="0" anchor="ctr"/>
+          <a:lstStyle/>
+          <a:p>
+            <a:pPr algn="ctr"/>
+            <a:r>
+              <a:rPr lang="en-US" sz="1200" dirty="0" smtClean="0">
+                <a:solidFill>
+                  <a:srgbClr val="002060"/>
+                </a:solidFill>
+              </a:rPr>
+              <a:t>Frontend Server</a:t>
+            </a:r>
+            <a:endParaRPr lang="en-US" sz="1600" dirty="0">
+              <a:solidFill>
+                <a:srgbClr val="002060"/>
+              </a:solidFill>
+            </a:endParaRPr>
+          </a:p>
+        </p:txBody>
+      </p:sp>
+      <p:sp>
+        <p:nvSpPr>
+          <p:cNvPr id="10" name="Rectangle 9"/>
+          <p:cNvSpPr/>
+          <p:nvPr/>
+        </p:nvSpPr>
+        <p:spPr>
+          <a:xfrm>
+            <a:off x="2209800" y="2786390"/>
+            <a:ext cx="1219200" cy="457200"/>
+          </a:xfrm>
+          <a:prstGeom prst="rect">
+            <a:avLst/>
+          </a:prstGeom>
+          <a:noFill/>
+        </p:spPr>
+        <p:style>
+          <a:lnRef idx="2">
+            <a:schemeClr val="accent1">
+              <a:shade val="50000"/>
+            </a:schemeClr>
+          </a:lnRef>
+          <a:fillRef idx="1">
+            <a:schemeClr val="accent1"/>
+          </a:fillRef>
+          <a:effectRef idx="0">
+            <a:schemeClr val="accent1"/>
+          </a:effectRef>
+          <a:fontRef idx="minor">
+            <a:schemeClr val="lt1"/>
+          </a:fontRef>
+        </p:style>
+        <p:txBody>
+          <a:bodyPr rtlCol="0" anchor="ctr"/>
+          <a:lstStyle/>
+          <a:p>
+            <a:pPr algn="ctr"/>
+            <a:r>
+              <a:rPr lang="en-US" sz="1200" dirty="0" smtClean="0">
+                <a:solidFill>
+                  <a:srgbClr val="002060"/>
+                </a:solidFill>
+              </a:rPr>
+              <a:t>Backend Server</a:t>
+            </a:r>
+            <a:endParaRPr lang="en-US" sz="1600" dirty="0">
+              <a:solidFill>
+                <a:srgbClr val="002060"/>
+              </a:solidFill>
+            </a:endParaRPr>
+          </a:p>
+        </p:txBody>
+      </p:sp>
+      <p:sp>
+        <p:nvSpPr>
+          <p:cNvPr id="11" name="Rectangle 10"/>
+          <p:cNvSpPr/>
+          <p:nvPr/>
+        </p:nvSpPr>
+        <p:spPr>
+          <a:xfrm>
+            <a:off x="2209800" y="3597158"/>
+            <a:ext cx="1219200" cy="457200"/>
+          </a:xfrm>
+          <a:prstGeom prst="rect">
+            <a:avLst/>
+          </a:prstGeom>
+          <a:noFill/>
+        </p:spPr>
+        <p:style>
+          <a:lnRef idx="2">
+            <a:schemeClr val="accent1">
+              <a:shade val="50000"/>
+            </a:schemeClr>
+          </a:lnRef>
+          <a:fillRef idx="1">
+            <a:schemeClr val="accent1"/>
+          </a:fillRef>
+          <a:effectRef idx="0">
+            <a:schemeClr val="accent1"/>
+          </a:effectRef>
+          <a:fontRef idx="minor">
+            <a:schemeClr val="lt1"/>
+          </a:fontRef>
+        </p:style>
+        <p:txBody>
+          <a:bodyPr rtlCol="0" anchor="ctr"/>
+          <a:lstStyle/>
+          <a:p>
+            <a:pPr algn="ctr"/>
+            <a:r>
+              <a:rPr lang="en-US" sz="1200" b="1" dirty="0" smtClean="0">
                 <a:solidFill>
                   <a:srgbClr val="002060"/>
                 </a:solidFill>
               </a:rPr>
               <a:t>MemDB Shard</a:t>
             </a:r>
-            <a:endParaRPr lang="en-US" sz="1400" dirty="0">
+            <a:endParaRPr lang="en-US" sz="1600" b="1" dirty="0">
               <a:solidFill>
                 <a:srgbClr val="002060"/>
               </a:solidFill>
@@ -4060,8 +5497,8 @@
         </p:nvCxnSpPr>
         <p:spPr>
           <a:xfrm>
-            <a:off x="2372868" y="3304032"/>
-            <a:ext cx="0" cy="277368"/>
+            <a:off x="2819400" y="3243590"/>
+            <a:ext cx="0" cy="353568"/>
           </a:xfrm>
           <a:prstGeom prst="straightConnector1">
             <a:avLst/>
@@ -4094,7 +5531,7 @@
         </p:nvSpPr>
         <p:spPr>
           <a:xfrm>
-            <a:off x="280416" y="3581400"/>
+            <a:off x="726948" y="3624590"/>
             <a:ext cx="1066800" cy="457200"/>
           </a:xfrm>
           <a:prstGeom prst="rect">
@@ -4124,14 +5561,14 @@
           <a:p>
             <a:pPr algn="ctr"/>
             <a:r>
-              <a:rPr lang="en-US" sz="1100" dirty="0" smtClean="0">
+              <a:rPr lang="en-US" sz="1200" dirty="0" smtClean="0">
                 <a:solidFill>
                   <a:srgbClr val="002060"/>
                 </a:solidFill>
               </a:rPr>
               <a:t>Shard Replica</a:t>
             </a:r>
-            <a:endParaRPr lang="en-US" sz="1400" dirty="0">
+            <a:endParaRPr lang="en-US" sz="1600" dirty="0">
               <a:solidFill>
                 <a:srgbClr val="002060"/>
               </a:solidFill>
@@ -4141,27 +5578,19 @@
       </p:sp>
       <p:sp>
         <p:nvSpPr>
-          <p:cNvPr id="19" name="Rectangle 18"/>
+          <p:cNvPr id="20" name="Rectangle 19"/>
           <p:cNvSpPr/>
           <p:nvPr/>
         </p:nvSpPr>
         <p:spPr>
           <a:xfrm>
-            <a:off x="3695700" y="2442972"/>
-            <a:ext cx="1676400" cy="1905000"/>
+            <a:off x="3924300" y="2786390"/>
+            <a:ext cx="1219200" cy="457200"/>
           </a:xfrm>
           <a:prstGeom prst="rect">
             <a:avLst/>
           </a:prstGeom>
           <a:noFill/>
-          <a:ln>
-            <a:solidFill>
-              <a:schemeClr val="accent1">
-                <a:shade val="50000"/>
-              </a:schemeClr>
-            </a:solidFill>
-            <a:prstDash val="solid"/>
-          </a:ln>
         </p:spPr>
         <p:style>
           <a:lnRef idx="2">
@@ -4184,19 +5613,31 @@
           <a:lstStyle/>
           <a:p>
             <a:pPr algn="ctr"/>
-            <a:endParaRPr lang="en-US" dirty="0"/>
-          </a:p>
-        </p:txBody>
-      </p:sp>
-      <p:sp>
-        <p:nvSpPr>
-          <p:cNvPr id="20" name="Rectangle 19"/>
+            <a:r>
+              <a:rPr lang="en-US" sz="1200" dirty="0">
+                <a:solidFill>
+                  <a:srgbClr val="002060"/>
+                </a:solidFill>
+              </a:rPr>
+              <a:t>Backend Server</a:t>
+            </a:r>
+            <a:endParaRPr lang="en-US" sz="1600" dirty="0">
+              <a:solidFill>
+                <a:srgbClr val="002060"/>
+              </a:solidFill>
+            </a:endParaRPr>
+          </a:p>
+        </p:txBody>
+      </p:sp>
+      <p:sp>
+        <p:nvSpPr>
+          <p:cNvPr id="21" name="Rectangle 20"/>
           <p:cNvSpPr/>
           <p:nvPr/>
         </p:nvSpPr>
         <p:spPr>
           <a:xfrm>
-            <a:off x="3924300" y="2846832"/>
+            <a:off x="3924300" y="3597158"/>
             <a:ext cx="1219200" cy="457200"/>
           </a:xfrm>
           <a:prstGeom prst="rect">
@@ -4226,14 +5667,14 @@
           <a:p>
             <a:pPr algn="ctr"/>
             <a:r>
-              <a:rPr lang="en-US" sz="1100" dirty="0" smtClean="0">
+              <a:rPr lang="en-US" sz="1200" b="1" dirty="0" smtClean="0">
                 <a:solidFill>
                   <a:srgbClr val="002060"/>
                 </a:solidFill>
               </a:rPr>
-              <a:t>MemDB Client</a:t>
-            </a:r>
-            <a:endParaRPr lang="en-US" sz="1400" dirty="0">
+              <a:t>MemDB Shard</a:t>
+            </a:r>
+            <a:endParaRPr lang="en-US" sz="1600" b="1" dirty="0">
               <a:solidFill>
                 <a:srgbClr val="002060"/>
               </a:solidFill>
@@ -4241,15 +5682,52 @@
           </a:p>
         </p:txBody>
       </p:sp>
-      <p:sp>
-        <p:nvSpPr>
-          <p:cNvPr id="21" name="Rectangle 20"/>
+      <p:cxnSp>
+        <p:nvCxnSpPr>
+          <p:cNvPr id="22" name="Straight Arrow Connector 21"/>
+          <p:cNvCxnSpPr>
+            <a:stCxn id="20" idx="2"/>
+            <a:endCxn id="21" idx="0"/>
+          </p:cNvCxnSpPr>
+          <p:nvPr/>
+        </p:nvCxnSpPr>
+        <p:spPr>
+          <a:xfrm>
+            <a:off x="4533900" y="3243590"/>
+            <a:ext cx="0" cy="353568"/>
+          </a:xfrm>
+          <a:prstGeom prst="straightConnector1">
+            <a:avLst/>
+          </a:prstGeom>
+          <a:ln>
+            <a:headEnd type="arrow"/>
+            <a:tailEnd type="arrow"/>
+          </a:ln>
+        </p:spPr>
+        <p:style>
+          <a:lnRef idx="1">
+            <a:schemeClr val="accent1"/>
+          </a:lnRef>
+          <a:fillRef idx="0">
+            <a:schemeClr val="accent1"/>
+          </a:fillRef>
+          <a:effectRef idx="0">
+            <a:schemeClr val="accent1"/>
+          </a:effectRef>
+          <a:fontRef idx="minor">
+            <a:schemeClr val="tx1"/>
+          </a:fontRef>
+        </p:style>
+      </p:cxnSp>
+      <p:sp>
+        <p:nvSpPr>
+          <p:cNvPr id="24" name="Rectangle 23"/>
           <p:cNvSpPr/>
           <p:nvPr/>
         </p:nvSpPr>
         <p:spPr>
           <a:xfrm>
-            <a:off x="3924300" y="3581400"/>
+            <a:off x="5670804" y="2786390"/>
             <a:ext cx="1219200" cy="457200"/>
           </a:xfrm>
           <a:prstGeom prst="rect">
@@ -4279,14 +5757,14 @@
           <a:p>
             <a:pPr algn="ctr"/>
             <a:r>
-              <a:rPr lang="en-US" sz="1100" dirty="0" smtClean="0">
+              <a:rPr lang="en-US" sz="1200" dirty="0">
                 <a:solidFill>
                   <a:srgbClr val="002060"/>
                 </a:solidFill>
               </a:rPr>
-              <a:t>MemDB Shard</a:t>
-            </a:r>
-            <a:endParaRPr lang="en-US" sz="1400" dirty="0">
+              <a:t>Backend Server</a:t>
+            </a:r>
+            <a:endParaRPr lang="en-US" sz="1600" dirty="0">
               <a:solidFill>
                 <a:srgbClr val="002060"/>
               </a:solidFill>
@@ -4294,66 +5772,21 @@
           </a:p>
         </p:txBody>
       </p:sp>
-      <p:cxnSp>
-        <p:nvCxnSpPr>
-          <p:cNvPr id="22" name="Straight Arrow Connector 21"/>
-          <p:cNvCxnSpPr>
-            <a:stCxn id="20" idx="2"/>
-            <a:endCxn id="21" idx="0"/>
-          </p:cNvCxnSpPr>
-          <p:nvPr/>
-        </p:nvCxnSpPr>
-        <p:spPr>
-          <a:xfrm>
-            <a:off x="4533900" y="3304032"/>
-            <a:ext cx="0" cy="277368"/>
-          </a:xfrm>
-          <a:prstGeom prst="straightConnector1">
-            <a:avLst/>
-          </a:prstGeom>
-          <a:ln>
-            <a:headEnd type="arrow"/>
-            <a:tailEnd type="arrow"/>
-          </a:ln>
-        </p:spPr>
-        <p:style>
-          <a:lnRef idx="1">
-            <a:schemeClr val="accent1"/>
-          </a:lnRef>
-          <a:fillRef idx="0">
-            <a:schemeClr val="accent1"/>
-          </a:fillRef>
-          <a:effectRef idx="0">
-            <a:schemeClr val="accent1"/>
-          </a:effectRef>
-          <a:fontRef idx="minor">
-            <a:schemeClr val="tx1"/>
-          </a:fontRef>
-        </p:style>
-      </p:cxnSp>
-      <p:sp>
-        <p:nvSpPr>
-          <p:cNvPr id="23" name="Rectangle 22"/>
+      <p:sp>
+        <p:nvSpPr>
+          <p:cNvPr id="25" name="Rectangle 24"/>
           <p:cNvSpPr/>
           <p:nvPr/>
         </p:nvSpPr>
         <p:spPr>
           <a:xfrm>
-            <a:off x="5878068" y="2442972"/>
-            <a:ext cx="1676400" cy="1905000"/>
+            <a:off x="5670804" y="3597158"/>
+            <a:ext cx="1219200" cy="457200"/>
           </a:xfrm>
           <a:prstGeom prst="rect">
             <a:avLst/>
           </a:prstGeom>
           <a:noFill/>
-          <a:ln>
-            <a:solidFill>
-              <a:schemeClr val="accent1">
-                <a:shade val="50000"/>
-              </a:schemeClr>
-            </a:solidFill>
-            <a:prstDash val="solid"/>
-          </a:ln>
         </p:spPr>
         <p:style>
           <a:lnRef idx="2">
@@ -4376,20 +5809,69 @@
           <a:lstStyle/>
           <a:p>
             <a:pPr algn="ctr"/>
-            <a:endParaRPr lang="en-US" dirty="0"/>
-          </a:p>
-        </p:txBody>
-      </p:sp>
-      <p:sp>
-        <p:nvSpPr>
-          <p:cNvPr id="24" name="Rectangle 23"/>
+            <a:r>
+              <a:rPr lang="en-US" sz="1200" b="1" dirty="0" smtClean="0">
+                <a:solidFill>
+                  <a:srgbClr val="002060"/>
+                </a:solidFill>
+              </a:rPr>
+              <a:t>MemDB Shard</a:t>
+            </a:r>
+            <a:endParaRPr lang="en-US" sz="1600" b="1" dirty="0">
+              <a:solidFill>
+                <a:srgbClr val="002060"/>
+              </a:solidFill>
+            </a:endParaRPr>
+          </a:p>
+        </p:txBody>
+      </p:sp>
+      <p:cxnSp>
+        <p:nvCxnSpPr>
+          <p:cNvPr id="26" name="Straight Arrow Connector 25"/>
+          <p:cNvCxnSpPr>
+            <a:stCxn id="24" idx="2"/>
+            <a:endCxn id="25" idx="0"/>
+          </p:cNvCxnSpPr>
+          <p:nvPr/>
+        </p:nvCxnSpPr>
+        <p:spPr>
+          <a:xfrm>
+            <a:off x="6280404" y="3243590"/>
+            <a:ext cx="0" cy="353568"/>
+          </a:xfrm>
+          <a:prstGeom prst="straightConnector1">
+            <a:avLst/>
+          </a:prstGeom>
+          <a:ln>
+            <a:headEnd type="arrow"/>
+            <a:tailEnd type="arrow"/>
+          </a:ln>
+        </p:spPr>
+        <p:style>
+          <a:lnRef idx="1">
+            <a:schemeClr val="accent1"/>
+          </a:lnRef>
+          <a:fillRef idx="0">
+            <a:schemeClr val="accent1"/>
+          </a:fillRef>
+          <a:effectRef idx="0">
+            <a:schemeClr val="accent1"/>
+          </a:effectRef>
+          <a:fontRef idx="minor">
+            <a:schemeClr val="tx1"/>
+          </a:fontRef>
+        </p:style>
+      </p:cxnSp>
+      <p:sp>
+        <p:nvSpPr>
+          <p:cNvPr id="27" name="Rectangle 26"/>
           <p:cNvSpPr/>
           <p:nvPr/>
         </p:nvSpPr>
         <p:spPr>
           <a:xfrm>
-            <a:off x="6106668" y="2846832"/>
-            <a:ext cx="1219200" cy="457200"/>
+            <a:off x="7315200" y="2787152"/>
+            <a:ext cx="1066800" cy="456438"/>
           </a:xfrm>
           <a:prstGeom prst="rect">
             <a:avLst/>
@@ -4418,14 +5900,14 @@
           <a:p>
             <a:pPr algn="ctr"/>
             <a:r>
-              <a:rPr lang="en-US" sz="1100" dirty="0" smtClean="0">
+              <a:rPr lang="en-US" sz="1200" dirty="0" smtClean="0">
                 <a:solidFill>
                   <a:srgbClr val="002060"/>
                 </a:solidFill>
               </a:rPr>
-              <a:t>MemDB Client</a:t>
-            </a:r>
-            <a:endParaRPr lang="en-US" sz="1400" dirty="0">
+              <a:t>Shard Replica</a:t>
+            </a:r>
+            <a:endParaRPr lang="en-US" sz="1600" dirty="0">
               <a:solidFill>
                 <a:srgbClr val="002060"/>
               </a:solidFill>
@@ -4435,14 +5917,14 @@
       </p:sp>
       <p:sp>
         <p:nvSpPr>
-          <p:cNvPr id="25" name="Rectangle 24"/>
+          <p:cNvPr id="28" name="Rectangle 27"/>
           <p:cNvSpPr/>
           <p:nvPr/>
         </p:nvSpPr>
         <p:spPr>
           <a:xfrm>
-            <a:off x="6106668" y="3581400"/>
-            <a:ext cx="1219200" cy="457200"/>
+            <a:off x="7315200" y="3597158"/>
+            <a:ext cx="1066800" cy="457200"/>
           </a:xfrm>
           <a:prstGeom prst="rect">
             <a:avLst/>
@@ -4471,157 +5953,14 @@
           <a:p>
             <a:pPr algn="ctr"/>
             <a:r>
-              <a:rPr lang="en-US" sz="1100" dirty="0" smtClean="0">
-                <a:solidFill>
-                  <a:srgbClr val="002060"/>
-                </a:solidFill>
-              </a:rPr>
-              <a:t>MemDB Shard</a:t>
-            </a:r>
-            <a:endParaRPr lang="en-US" sz="1400" dirty="0">
-              <a:solidFill>
-                <a:srgbClr val="002060"/>
-              </a:solidFill>
-            </a:endParaRPr>
-          </a:p>
-        </p:txBody>
-      </p:sp>
-      <p:cxnSp>
-        <p:nvCxnSpPr>
-          <p:cNvPr id="26" name="Straight Arrow Connector 25"/>
-          <p:cNvCxnSpPr>
-            <a:stCxn id="24" idx="2"/>
-            <a:endCxn id="25" idx="0"/>
-          </p:cNvCxnSpPr>
-          <p:nvPr/>
-        </p:nvCxnSpPr>
-        <p:spPr>
-          <a:xfrm>
-            <a:off x="6716268" y="3304032"/>
-            <a:ext cx="0" cy="277368"/>
-          </a:xfrm>
-          <a:prstGeom prst="straightConnector1">
-            <a:avLst/>
-          </a:prstGeom>
-          <a:ln>
-            <a:headEnd type="arrow"/>
-            <a:tailEnd type="arrow"/>
-          </a:ln>
-        </p:spPr>
-        <p:style>
-          <a:lnRef idx="1">
-            <a:schemeClr val="accent1"/>
-          </a:lnRef>
-          <a:fillRef idx="0">
-            <a:schemeClr val="accent1"/>
-          </a:fillRef>
-          <a:effectRef idx="0">
-            <a:schemeClr val="accent1"/>
-          </a:effectRef>
-          <a:fontRef idx="minor">
-            <a:schemeClr val="tx1"/>
-          </a:fontRef>
-        </p:style>
-      </p:cxnSp>
-      <p:sp>
-        <p:nvSpPr>
-          <p:cNvPr id="27" name="Rectangle 26"/>
-          <p:cNvSpPr/>
-          <p:nvPr/>
-        </p:nvSpPr>
-        <p:spPr>
-          <a:xfrm>
-            <a:off x="7751064" y="2847594"/>
-            <a:ext cx="1066800" cy="456438"/>
-          </a:xfrm>
-          <a:prstGeom prst="rect">
-            <a:avLst/>
-          </a:prstGeom>
-          <a:noFill/>
-        </p:spPr>
-        <p:style>
-          <a:lnRef idx="2">
-            <a:schemeClr val="accent1">
-              <a:shade val="50000"/>
-            </a:schemeClr>
-          </a:lnRef>
-          <a:fillRef idx="1">
-            <a:schemeClr val="accent1"/>
-          </a:fillRef>
-          <a:effectRef idx="0">
-            <a:schemeClr val="accent1"/>
-          </a:effectRef>
-          <a:fontRef idx="minor">
-            <a:schemeClr val="lt1"/>
-          </a:fontRef>
-        </p:style>
-        <p:txBody>
-          <a:bodyPr rtlCol="0" anchor="ctr"/>
-          <a:lstStyle/>
-          <a:p>
-            <a:pPr algn="ctr"/>
-            <a:r>
-              <a:rPr lang="en-US" sz="1100" dirty="0" smtClean="0">
+              <a:rPr lang="en-US" sz="1200" dirty="0" smtClean="0">
                 <a:solidFill>
                   <a:srgbClr val="002060"/>
                 </a:solidFill>
               </a:rPr>
               <a:t>Shard Replica</a:t>
             </a:r>
-            <a:endParaRPr lang="en-US" sz="1400" dirty="0">
-              <a:solidFill>
-                <a:srgbClr val="002060"/>
-              </a:solidFill>
-            </a:endParaRPr>
-          </a:p>
-        </p:txBody>
-      </p:sp>
-      <p:sp>
-        <p:nvSpPr>
-          <p:cNvPr id="28" name="Rectangle 27"/>
-          <p:cNvSpPr/>
-          <p:nvPr/>
-        </p:nvSpPr>
-        <p:spPr>
-          <a:xfrm>
-            <a:off x="7751064" y="3581400"/>
-            <a:ext cx="1066800" cy="457200"/>
-          </a:xfrm>
-          <a:prstGeom prst="rect">
-            <a:avLst/>
-          </a:prstGeom>
-          <a:noFill/>
-        </p:spPr>
-        <p:style>
-          <a:lnRef idx="2">
-            <a:schemeClr val="accent1">
-              <a:shade val="50000"/>
-            </a:schemeClr>
-          </a:lnRef>
-          <a:fillRef idx="1">
-            <a:schemeClr val="accent1"/>
-          </a:fillRef>
-          <a:effectRef idx="0">
-            <a:schemeClr val="accent1"/>
-          </a:effectRef>
-          <a:fontRef idx="minor">
-            <a:schemeClr val="lt1"/>
-          </a:fontRef>
-        </p:style>
-        <p:txBody>
-          <a:bodyPr rtlCol="0" anchor="ctr"/>
-          <a:lstStyle/>
-          <a:p>
-            <a:pPr algn="ctr"/>
-            <a:r>
-              <a:rPr lang="en-US" sz="1100" dirty="0" smtClean="0">
-                <a:solidFill>
-                  <a:srgbClr val="002060"/>
-                </a:solidFill>
-              </a:rPr>
-              <a:t>Shard Replica</a:t>
-            </a:r>
-            <a:endParaRPr lang="en-US" sz="1400" dirty="0">
+            <a:endParaRPr lang="en-US" sz="1600" dirty="0">
               <a:solidFill>
                 <a:srgbClr val="002060"/>
               </a:solidFill>
@@ -4634,13 +5973,12 @@
           <p:cNvPr id="30" name="Straight Arrow Connector 29"/>
           <p:cNvCxnSpPr>
             <a:stCxn id="11" idx="1"/>
-            <a:endCxn id="17" idx="3"/>
           </p:cNvCxnSpPr>
           <p:nvPr/>
         </p:nvCxnSpPr>
         <p:spPr>
           <a:xfrm flipH="1">
-            <a:off x="1347216" y="3810000"/>
+            <a:off x="1793748" y="3825758"/>
             <a:ext cx="416052" cy="0"/>
           </a:xfrm>
           <a:prstGeom prst="straightConnector1">
@@ -4676,7 +6014,7 @@
         </p:nvCxnSpPr>
         <p:spPr>
           <a:xfrm>
-            <a:off x="7325868" y="3810000"/>
+            <a:off x="6890004" y="3825758"/>
             <a:ext cx="425196" cy="0"/>
           </a:xfrm>
           <a:prstGeom prst="straightConnector1">
@@ -4709,8 +6047,8 @@
         </p:nvSpPr>
         <p:spPr>
           <a:xfrm>
-            <a:off x="1524000" y="5149915"/>
-            <a:ext cx="1687068" cy="914400"/>
+            <a:off x="2209800" y="4812106"/>
+            <a:ext cx="1219200" cy="793684"/>
           </a:xfrm>
           <a:prstGeom prst="rect">
             <a:avLst/>
@@ -4742,16 +6080,24 @@
           <a:p>
             <a:pPr algn="ctr"/>
             <a:r>
+              <a:rPr lang="en-US" sz="1200" b="1" dirty="0" smtClean="0">
+                <a:solidFill>
+                  <a:srgbClr val="002060"/>
+                </a:solidFill>
+              </a:rPr>
+              <a:t>Backend Storage</a:t>
+            </a:r>
+          </a:p>
+          <a:p>
+            <a:pPr algn="ctr"/>
+            <a:r>
               <a:rPr lang="en-US" sz="1200" dirty="0" smtClean="0">
                 <a:solidFill>
                   <a:srgbClr val="002060"/>
                 </a:solidFill>
               </a:rPr>
-              <a:t>Backend Storage</a:t>
-            </a:r>
-          </a:p>
-          <a:p>
-            <a:pPr algn="ctr"/>
+              <a:t>(</a:t>
+            </a:r>
             <a:r>
               <a:rPr lang="en-US" sz="1200" dirty="0" err="1" smtClean="0">
                 <a:solidFill>
@@ -4766,7 +6112,7 @@
                   <a:srgbClr val="002060"/>
                 </a:solidFill>
               </a:rPr>
-              <a:t> (Cluster)</a:t>
+              <a:t>)</a:t>
             </a:r>
             <a:endParaRPr lang="en-US" sz="1600" dirty="0">
               <a:solidFill>
@@ -4784,8 +6130,8 @@
         </p:nvSpPr>
         <p:spPr>
           <a:xfrm>
-            <a:off x="3695700" y="5149915"/>
-            <a:ext cx="1676400" cy="914400"/>
+            <a:off x="3924300" y="4812106"/>
+            <a:ext cx="1219200" cy="793684"/>
           </a:xfrm>
           <a:prstGeom prst="rect">
             <a:avLst/>
@@ -4817,16 +6163,24 @@
           <a:p>
             <a:pPr algn="ctr"/>
             <a:r>
+              <a:rPr lang="en-US" sz="1200" b="1" dirty="0" smtClean="0">
+                <a:solidFill>
+                  <a:srgbClr val="002060"/>
+                </a:solidFill>
+              </a:rPr>
+              <a:t>Global Locking</a:t>
+            </a:r>
+          </a:p>
+          <a:p>
+            <a:pPr algn="ctr"/>
+            <a:r>
               <a:rPr lang="en-US" sz="1200" dirty="0" smtClean="0">
                 <a:solidFill>
                   <a:srgbClr val="002060"/>
                 </a:solidFill>
               </a:rPr>
-              <a:t>Global Locking</a:t>
-            </a:r>
-          </a:p>
-          <a:p>
-            <a:pPr algn="ctr"/>
+              <a:t>(</a:t>
+            </a:r>
             <a:r>
               <a:rPr lang="en-US" sz="1200" dirty="0" err="1" smtClean="0">
                 <a:solidFill>
@@ -4836,12 +6190,12 @@
               <a:t>Redis</a:t>
             </a:r>
             <a:r>
-              <a:rPr lang="en-US" sz="1200" dirty="0" smtClean="0">
+              <a:rPr lang="en-US" sz="1200" dirty="0">
                 <a:solidFill>
                   <a:srgbClr val="002060"/>
                 </a:solidFill>
               </a:rPr>
-              <a:t> (Cluster)</a:t>
+              <a:t>)</a:t>
             </a:r>
             <a:endParaRPr lang="en-US" sz="1600" dirty="0">
               <a:solidFill>
@@ -4860,9 +6214,9 @@
           <p:nvPr/>
         </p:nvCxnSpPr>
         <p:spPr>
-          <a:xfrm>
-            <a:off x="2372868" y="4038600"/>
-            <a:ext cx="0" cy="761999"/>
+          <a:xfrm flipH="1">
+            <a:off x="2816733" y="4054358"/>
+            <a:ext cx="2667" cy="408431"/>
           </a:xfrm>
           <a:prstGeom prst="straightConnector1">
             <a:avLst/>
@@ -4898,8 +6252,8 @@
         </p:nvCxnSpPr>
         <p:spPr>
           <a:xfrm>
-            <a:off x="4533900" y="4038600"/>
-            <a:ext cx="0" cy="761999"/>
+            <a:off x="4533900" y="4054358"/>
+            <a:ext cx="0" cy="408431"/>
           </a:xfrm>
           <a:prstGeom prst="straightConnector1">
             <a:avLst/>
@@ -4934,8 +6288,8 @@
         </p:nvCxnSpPr>
         <p:spPr>
           <a:xfrm flipV="1">
-            <a:off x="6716268" y="4038600"/>
-            <a:ext cx="0" cy="761999"/>
+            <a:off x="6280404" y="4054358"/>
+            <a:ext cx="0" cy="408431"/>
           </a:xfrm>
           <a:prstGeom prst="straightConnector1">
             <a:avLst/>
@@ -4964,15 +6318,14 @@
         <p:nvCxnSpPr>
           <p:cNvPr id="81" name="Straight Arrow Connector 80"/>
           <p:cNvCxnSpPr>
-            <a:stCxn id="4" idx="2"/>
-            <a:endCxn id="9" idx="0"/>
+            <a:endCxn id="10" idx="0"/>
           </p:cNvCxnSpPr>
           <p:nvPr/>
         </p:nvCxnSpPr>
         <p:spPr>
-          <a:xfrm flipH="1">
-            <a:off x="2372868" y="1430015"/>
-            <a:ext cx="2161032" cy="1012957"/>
+          <a:xfrm>
+            <a:off x="2814066" y="2006605"/>
+            <a:ext cx="5334" cy="779785"/>
           </a:xfrm>
           <a:prstGeom prst="straightConnector1">
             <a:avLst/>
@@ -5001,14 +6354,14 @@
           <p:cNvPr id="83" name="Straight Arrow Connector 82"/>
           <p:cNvCxnSpPr>
             <a:stCxn id="4" idx="2"/>
-            <a:endCxn id="19" idx="0"/>
+            <a:endCxn id="20" idx="0"/>
           </p:cNvCxnSpPr>
           <p:nvPr/>
         </p:nvCxnSpPr>
         <p:spPr>
           <a:xfrm>
-            <a:off x="4533900" y="1430015"/>
-            <a:ext cx="0" cy="1012957"/>
+            <a:off x="4533900" y="2006605"/>
+            <a:ext cx="0" cy="779785"/>
           </a:xfrm>
           <a:prstGeom prst="straightConnector1">
             <a:avLst/>
@@ -5036,15 +6389,14 @@
         <p:nvCxnSpPr>
           <p:cNvPr id="85" name="Straight Arrow Connector 84"/>
           <p:cNvCxnSpPr>
-            <a:stCxn id="4" idx="2"/>
-            <a:endCxn id="23" idx="0"/>
+            <a:endCxn id="24" idx="0"/>
           </p:cNvCxnSpPr>
           <p:nvPr/>
         </p:nvCxnSpPr>
         <p:spPr>
           <a:xfrm>
-            <a:off x="4533900" y="1430015"/>
-            <a:ext cx="2182368" cy="1012957"/>
+            <a:off x="6278118" y="2006605"/>
+            <a:ext cx="2286" cy="779785"/>
           </a:xfrm>
           <a:prstGeom prst="straightConnector1">
             <a:avLst/>
@@ -5076,8 +6428,8 @@
         </p:nvSpPr>
         <p:spPr>
           <a:xfrm>
-            <a:off x="2895600" y="1903056"/>
-            <a:ext cx="763715" cy="261610"/>
+            <a:off x="2410872" y="2047905"/>
+            <a:ext cx="763715" cy="276999"/>
           </a:xfrm>
           <a:prstGeom prst="rect">
             <a:avLst/>
@@ -5091,10 +6443,10 @@
           <a:lstStyle/>
           <a:p>
             <a:r>
-              <a:rPr lang="en-US" sz="1100" dirty="0" smtClean="0"/>
+              <a:rPr lang="en-US" sz="1200" dirty="0" smtClean="0"/>
               <a:t>Routing</a:t>
             </a:r>
-            <a:endParaRPr lang="en-US" sz="1100" dirty="0"/>
+            <a:endParaRPr lang="en-US" sz="1200" dirty="0"/>
           </a:p>
         </p:txBody>
       </p:sp>
@@ -5106,8 +6458,8 @@
         </p:nvSpPr>
         <p:spPr>
           <a:xfrm>
-            <a:off x="4152613" y="1897932"/>
-            <a:ext cx="763715" cy="261610"/>
+            <a:off x="4152042" y="2047905"/>
+            <a:ext cx="763715" cy="276999"/>
           </a:xfrm>
           <a:prstGeom prst="rect">
             <a:avLst/>
@@ -5121,10 +6473,10 @@
           <a:lstStyle/>
           <a:p>
             <a:r>
-              <a:rPr lang="en-US" sz="1100" dirty="0" smtClean="0"/>
+              <a:rPr lang="en-US" sz="1200" dirty="0" smtClean="0"/>
               <a:t>Routing</a:t>
             </a:r>
-            <a:endParaRPr lang="en-US" sz="1100" dirty="0"/>
+            <a:endParaRPr lang="en-US" sz="1200" dirty="0"/>
           </a:p>
         </p:txBody>
       </p:sp>
@@ -5136,8 +6488,8 @@
         </p:nvSpPr>
         <p:spPr>
           <a:xfrm>
-            <a:off x="5560885" y="1903056"/>
-            <a:ext cx="763715" cy="261610"/>
+            <a:off x="5896259" y="2037476"/>
+            <a:ext cx="763715" cy="276999"/>
           </a:xfrm>
           <a:prstGeom prst="rect">
             <a:avLst/>
@@ -5151,10 +6503,10 @@
           <a:lstStyle/>
           <a:p>
             <a:r>
-              <a:rPr lang="en-US" sz="1100" dirty="0" smtClean="0"/>
+              <a:rPr lang="en-US" sz="1200" dirty="0" smtClean="0"/>
               <a:t>Routing</a:t>
             </a:r>
-            <a:endParaRPr lang="en-US" sz="1100" dirty="0"/>
+            <a:endParaRPr lang="en-US" sz="1200" dirty="0"/>
           </a:p>
         </p:txBody>
       </p:sp>
@@ -5169,13 +6521,13 @@
         </p:nvCxnSpPr>
         <p:spPr>
           <a:xfrm flipV="1">
-            <a:off x="5143500" y="2847594"/>
-            <a:ext cx="3140964" cy="962406"/>
+            <a:off x="5143500" y="2787152"/>
+            <a:ext cx="2705100" cy="1038606"/>
           </a:xfrm>
           <a:prstGeom prst="bentConnector4">
             <a:avLst>
-              <a:gd name="adj1" fmla="val 15017"/>
-              <a:gd name="adj2" fmla="val 161758"/>
+              <a:gd name="adj1" fmla="val 9718"/>
+              <a:gd name="adj2" fmla="val 122010"/>
             </a:avLst>
           </a:prstGeom>
           <a:ln>
@@ -5199,14 +6551,14 @@
       </p:cxnSp>
       <p:sp>
         <p:nvSpPr>
-          <p:cNvPr id="178" name="TextBox 177"/>
+          <p:cNvPr id="194" name="TextBox 193"/>
           <p:cNvSpPr txBox="1"/>
           <p:nvPr/>
         </p:nvSpPr>
         <p:spPr>
           <a:xfrm>
-            <a:off x="1802129" y="2466201"/>
-            <a:ext cx="1173480" cy="276999"/>
+            <a:off x="3943348" y="6062989"/>
+            <a:ext cx="1238250" cy="276999"/>
           </a:xfrm>
           <a:prstGeom prst="rect">
             <a:avLst/>
@@ -5221,99 +6573,9 @@
           <a:p>
             <a:r>
               <a:rPr lang="en-US" sz="1200" dirty="0" smtClean="0"/>
-              <a:t>Backend Server</a:t>
+              <a:t>Backend Servers</a:t>
             </a:r>
             <a:endParaRPr lang="en-US" sz="1200" dirty="0"/>
-          </a:p>
-        </p:txBody>
-      </p:sp>
-      <p:sp>
-        <p:nvSpPr>
-          <p:cNvPr id="179" name="TextBox 178"/>
-          <p:cNvSpPr txBox="1"/>
-          <p:nvPr/>
-        </p:nvSpPr>
-        <p:spPr>
-          <a:xfrm>
-            <a:off x="3947160" y="2472297"/>
-            <a:ext cx="1173480" cy="276999"/>
-          </a:xfrm>
-          <a:prstGeom prst="rect">
-            <a:avLst/>
-          </a:prstGeom>
-          <a:noFill/>
-        </p:spPr>
-        <p:txBody>
-          <a:bodyPr wrap="square" rtlCol="0">
-            <a:spAutoFit/>
-          </a:bodyPr>
-          <a:lstStyle/>
-          <a:p>
-            <a:r>
-              <a:rPr lang="en-US" sz="1200" dirty="0" smtClean="0"/>
-              <a:t>Backend Server</a:t>
-            </a:r>
-            <a:endParaRPr lang="en-US" sz="1200" dirty="0"/>
-          </a:p>
-        </p:txBody>
-      </p:sp>
-      <p:sp>
-        <p:nvSpPr>
-          <p:cNvPr id="180" name="TextBox 179"/>
-          <p:cNvSpPr txBox="1"/>
-          <p:nvPr/>
-        </p:nvSpPr>
-        <p:spPr>
-          <a:xfrm>
-            <a:off x="6152388" y="2466200"/>
-            <a:ext cx="1173480" cy="276999"/>
-          </a:xfrm>
-          <a:prstGeom prst="rect">
-            <a:avLst/>
-          </a:prstGeom>
-          <a:noFill/>
-        </p:spPr>
-        <p:txBody>
-          <a:bodyPr wrap="square" rtlCol="0">
-            <a:spAutoFit/>
-          </a:bodyPr>
-          <a:lstStyle/>
-          <a:p>
-            <a:r>
-              <a:rPr lang="en-US" sz="1200" dirty="0" smtClean="0"/>
-              <a:t>Backend Server</a:t>
-            </a:r>
-            <a:endParaRPr lang="en-US" sz="1200" dirty="0"/>
-          </a:p>
-        </p:txBody>
-      </p:sp>
-      <p:sp>
-        <p:nvSpPr>
-          <p:cNvPr id="194" name="TextBox 193"/>
-          <p:cNvSpPr txBox="1"/>
-          <p:nvPr/>
-        </p:nvSpPr>
-        <p:spPr>
-          <a:xfrm>
-            <a:off x="3924300" y="6295361"/>
-            <a:ext cx="1371600" cy="276999"/>
-          </a:xfrm>
-          <a:prstGeom prst="rect">
-            <a:avLst/>
-          </a:prstGeom>
-          <a:noFill/>
-        </p:spPr>
-        <p:txBody>
-          <a:bodyPr wrap="square" rtlCol="0">
-            <a:spAutoFit/>
-          </a:bodyPr>
-          <a:lstStyle/>
-          <a:p>
-            <a:r>
-              <a:rPr lang="en-US" sz="1200" b="1" dirty="0" smtClean="0"/>
-              <a:t>MemDB Cluster</a:t>
-            </a:r>
-            <a:endParaRPr lang="en-US" sz="1200" b="1" dirty="0"/>
           </a:p>
         </p:txBody>
       </p:sp>
@@ -5325,8 +6587,8 @@
         </p:nvSpPr>
         <p:spPr>
           <a:xfrm>
-            <a:off x="5878068" y="5149915"/>
-            <a:ext cx="1676400" cy="914400"/>
+            <a:off x="5670804" y="4812106"/>
+            <a:ext cx="1219200" cy="793684"/>
           </a:xfrm>
           <a:prstGeom prst="rect">
             <a:avLst/>
@@ -5358,16 +6620,24 @@
           <a:p>
             <a:pPr algn="ctr"/>
             <a:r>
+              <a:rPr lang="en-US" sz="1200" b="1" dirty="0" smtClean="0">
+                <a:solidFill>
+                  <a:srgbClr val="002060"/>
+                </a:solidFill>
+              </a:rPr>
+              <a:t>Global Event</a:t>
+            </a:r>
+          </a:p>
+          <a:p>
+            <a:pPr algn="ctr"/>
+            <a:r>
               <a:rPr lang="en-US" sz="1200" dirty="0" smtClean="0">
                 <a:solidFill>
                   <a:srgbClr val="002060"/>
                 </a:solidFill>
               </a:rPr>
-              <a:t>Global Event</a:t>
-            </a:r>
-          </a:p>
-          <a:p>
-            <a:pPr algn="ctr"/>
+              <a:t>(</a:t>
+            </a:r>
             <a:r>
               <a:rPr lang="en-US" sz="1200" dirty="0" err="1" smtClean="0">
                 <a:solidFill>
@@ -5376,6 +6646,14 @@
               </a:rPr>
               <a:t>Redis</a:t>
             </a:r>
+            <a:r>
+              <a:rPr lang="en-US" sz="1200" dirty="0" smtClean="0">
+                <a:solidFill>
+                  <a:srgbClr val="002060"/>
+                </a:solidFill>
+              </a:rPr>
+              <a:t>)</a:t>
+            </a:r>
             <a:endParaRPr lang="en-US" sz="1600" dirty="0">
               <a:solidFill>
                 <a:srgbClr val="002060"/>
@@ -5392,8 +6670,8 @@
         </p:nvSpPr>
         <p:spPr>
           <a:xfrm>
-            <a:off x="1066800" y="4800599"/>
-            <a:ext cx="6934200" cy="1447801"/>
+            <a:off x="1773174" y="4462789"/>
+            <a:ext cx="5521452" cy="1371601"/>
           </a:xfrm>
           <a:prstGeom prst="rect">
             <a:avLst/>
@@ -5424,7 +6702,7 @@
           <a:lstStyle/>
           <a:p>
             <a:pPr algn="ctr"/>
-            <a:endParaRPr lang="en-US"/>
+            <a:endParaRPr lang="en-US" sz="2000"/>
           </a:p>
         </p:txBody>
       </p:sp>
@@ -5436,8 +6714,8 @@
         </p:nvSpPr>
         <p:spPr>
           <a:xfrm>
-            <a:off x="4000500" y="4845115"/>
-            <a:ext cx="1066800" cy="261610"/>
+            <a:off x="3619500" y="4507306"/>
+            <a:ext cx="1828800" cy="276999"/>
           </a:xfrm>
           <a:prstGeom prst="rect">
             <a:avLst/>
@@ -5451,10 +6729,86 @@
           <a:lstStyle/>
           <a:p>
             <a:r>
-              <a:rPr lang="en-US" sz="1100" dirty="0" smtClean="0"/>
-              <a:t>Global Services</a:t>
-            </a:r>
-            <a:endParaRPr lang="en-US" sz="1100" dirty="0"/>
+              <a:rPr lang="en-US" sz="1200" dirty="0" err="1" smtClean="0"/>
+              <a:t>MemDB</a:t>
+            </a:r>
+            <a:r>
+              <a:rPr lang="en-US" sz="1200" dirty="0" smtClean="0"/>
+              <a:t> Global </a:t>
+            </a:r>
+            <a:r>
+              <a:rPr lang="en-US" sz="1200" dirty="0" smtClean="0"/>
+              <a:t>Services</a:t>
+            </a:r>
+            <a:endParaRPr lang="en-US" sz="1200" dirty="0"/>
+          </a:p>
+        </p:txBody>
+      </p:sp>
+      <p:sp>
+        <p:nvSpPr>
+          <p:cNvPr id="70" name="TextBox 69"/>
+          <p:cNvSpPr txBox="1"/>
+          <p:nvPr/>
+        </p:nvSpPr>
+        <p:spPr>
+          <a:xfrm>
+            <a:off x="3924299" y="1762780"/>
+            <a:ext cx="1276349" cy="276999"/>
+          </a:xfrm>
+          <a:prstGeom prst="rect">
+            <a:avLst/>
+          </a:prstGeom>
+          <a:noFill/>
+        </p:spPr>
+        <p:txBody>
+          <a:bodyPr wrap="square" rtlCol="0">
+            <a:spAutoFit/>
+          </a:bodyPr>
+          <a:lstStyle/>
+          <a:p>
+            <a:r>
+              <a:rPr lang="en-US" sz="1200" dirty="0" smtClean="0"/>
+              <a:t>Frontend servers</a:t>
+            </a:r>
+            <a:endParaRPr lang="en-US" sz="1200" dirty="0"/>
+          </a:p>
+        </p:txBody>
+      </p:sp>
+      <p:sp>
+        <p:nvSpPr>
+          <p:cNvPr id="56" name="TextBox 55"/>
+          <p:cNvSpPr txBox="1"/>
+          <p:nvPr/>
+        </p:nvSpPr>
+        <p:spPr>
+          <a:xfrm>
+            <a:off x="2695574" y="304800"/>
+            <a:ext cx="3676650" cy="461665"/>
+          </a:xfrm>
+          <a:prstGeom prst="rect">
+            <a:avLst/>
+          </a:prstGeom>
+          <a:noFill/>
+        </p:spPr>
+        <p:txBody>
+          <a:bodyPr wrap="square" rtlCol="0">
+            <a:spAutoFit/>
+          </a:bodyPr>
+          <a:lstStyle/>
+          <a:p>
+            <a:r>
+              <a:rPr lang="en-US" sz="2400" b="1" dirty="0" smtClean="0"/>
+              <a:t>Quick </a:t>
+            </a:r>
+            <a:r>
+              <a:rPr lang="en-US" sz="2400" b="1" dirty="0" err="1" smtClean="0"/>
+              <a:t>Pomelo</a:t>
+            </a:r>
+            <a:r>
+              <a:rPr lang="en-US" sz="2400" b="1" dirty="0" smtClean="0"/>
+              <a:t> Architecture</a:t>
+            </a:r>
+            <a:endParaRPr lang="en-US" sz="2400" b="1" dirty="0"/>
           </a:p>
         </p:txBody>
       </p:sp>
@@ -5471,7 +6825,7 @@
 </p:sld>
 </file>
 
-<file path=ppt/slides/slide2.xml><?xml version="1.0" encoding="utf-8"?>
+<file path=ppt/slides/slide3.xml><?xml version="1.0" encoding="utf-8"?>
 <p:sld xmlns:a="http://schemas.openxmlformats.org/drawingml/2006/main" xmlns:r="http://schemas.openxmlformats.org/officeDocument/2006/relationships" xmlns:p="http://schemas.openxmlformats.org/presentationml/2006/main">
   <p:cSld>
     <p:spTree>

</xml_diff>